<commit_message>
Added teacher sample files including Website Starter Kit
</commit_message>
<xml_diff>
--- a/HTML5 Cheat Sheet.pptx
+++ b/HTML5 Cheat Sheet.pptx
@@ -328,7 +328,7 @@
             <a:fld id="{B5D0B8F2-3698-4F49-BFDB-59FA0C453FCA}" type="datetimeFigureOut">
               <a:rPr lang="en-US" smtClean="0"/>
               <a:pPr/>
-              <a:t>7/8/2013</a:t>
+              <a:t>7/10/2013</a:t>
             </a:fld>
             <a:endParaRPr lang="en-US"/>
           </a:p>
@@ -517,7 +517,7 @@
             <a:fld id="{B5D0B8F2-3698-4F49-BFDB-59FA0C453FCA}" type="datetimeFigureOut">
               <a:rPr lang="en-US" smtClean="0"/>
               <a:pPr/>
-              <a:t>7/8/2013</a:t>
+              <a:t>7/10/2013</a:t>
             </a:fld>
             <a:endParaRPr lang="en-US"/>
           </a:p>
@@ -694,7 +694,7 @@
             <a:fld id="{B5D0B8F2-3698-4F49-BFDB-59FA0C453FCA}" type="datetimeFigureOut">
               <a:rPr lang="en-US" smtClean="0"/>
               <a:pPr/>
-              <a:t>7/8/2013</a:t>
+              <a:t>7/10/2013</a:t>
             </a:fld>
             <a:endParaRPr lang="en-US"/>
           </a:p>
@@ -876,7 +876,7 @@
             <a:fld id="{B5D0B8F2-3698-4F49-BFDB-59FA0C453FCA}" type="datetimeFigureOut">
               <a:rPr lang="en-US" smtClean="0"/>
               <a:pPr/>
-              <a:t>7/8/2013</a:t>
+              <a:t>7/10/2013</a:t>
             </a:fld>
             <a:endParaRPr lang="en-US"/>
           </a:p>
@@ -1125,7 +1125,7 @@
             <a:fld id="{B5D0B8F2-3698-4F49-BFDB-59FA0C453FCA}" type="datetimeFigureOut">
               <a:rPr lang="en-US" smtClean="0"/>
               <a:pPr/>
-              <a:t>7/8/2013</a:t>
+              <a:t>7/10/2013</a:t>
             </a:fld>
             <a:endParaRPr lang="en-US"/>
           </a:p>
@@ -1601,7 +1601,7 @@
             <a:fld id="{B5D0B8F2-3698-4F49-BFDB-59FA0C453FCA}" type="datetimeFigureOut">
               <a:rPr lang="en-US" smtClean="0"/>
               <a:pPr/>
-              <a:t>7/8/2013</a:t>
+              <a:t>7/10/2013</a:t>
             </a:fld>
             <a:endParaRPr lang="en-US"/>
           </a:p>
@@ -2018,7 +2018,7 @@
             <a:fld id="{B5D0B8F2-3698-4F49-BFDB-59FA0C453FCA}" type="datetimeFigureOut">
               <a:rPr lang="en-US" smtClean="0"/>
               <a:pPr/>
-              <a:t>7/8/2013</a:t>
+              <a:t>7/10/2013</a:t>
             </a:fld>
             <a:endParaRPr lang="en-US"/>
           </a:p>
@@ -2151,7 +2151,7 @@
             <a:fld id="{B5D0B8F2-3698-4F49-BFDB-59FA0C453FCA}" type="datetimeFigureOut">
               <a:rPr lang="en-US" smtClean="0"/>
               <a:pPr/>
-              <a:t>7/8/2013</a:t>
+              <a:t>7/10/2013</a:t>
             </a:fld>
             <a:endParaRPr lang="en-US"/>
           </a:p>
@@ -2248,7 +2248,7 @@
             <a:fld id="{B5D0B8F2-3698-4F49-BFDB-59FA0C453FCA}" type="datetimeFigureOut">
               <a:rPr lang="en-US" smtClean="0"/>
               <a:pPr/>
-              <a:t>7/8/2013</a:t>
+              <a:t>7/10/2013</a:t>
             </a:fld>
             <a:endParaRPr lang="en-US"/>
           </a:p>
@@ -2528,7 +2528,7 @@
             <a:fld id="{B5D0B8F2-3698-4F49-BFDB-59FA0C453FCA}" type="datetimeFigureOut">
               <a:rPr lang="en-US" smtClean="0"/>
               <a:pPr/>
-              <a:t>7/8/2013</a:t>
+              <a:t>7/10/2013</a:t>
             </a:fld>
             <a:endParaRPr lang="en-US"/>
           </a:p>
@@ -2782,7 +2782,7 @@
             <a:fld id="{B5D0B8F2-3698-4F49-BFDB-59FA0C453FCA}" type="datetimeFigureOut">
               <a:rPr lang="en-US" smtClean="0"/>
               <a:pPr/>
-              <a:t>7/8/2013</a:t>
+              <a:t>7/10/2013</a:t>
             </a:fld>
             <a:endParaRPr lang="en-US"/>
           </a:p>
@@ -3156,7 +3156,7 @@
             <a:fld id="{B5D0B8F2-3698-4F49-BFDB-59FA0C453FCA}" type="datetimeFigureOut">
               <a:rPr lang="en-US" smtClean="0"/>
               <a:pPr/>
-              <a:t>7/8/2013</a:t>
+              <a:t>7/10/2013</a:t>
             </a:fld>
             <a:endParaRPr lang="en-US"/>
           </a:p>
@@ -3600,11 +3600,7 @@
           <a:p>
             <a:r>
               <a:rPr lang="en-US" dirty="0" smtClean="0"/>
-              <a:t>HTML5 Cheat </a:t>
-            </a:r>
-            <a:r>
-              <a:rPr lang="en-US" dirty="0" smtClean="0"/>
-              <a:t>Sheet </a:t>
+              <a:t>HTML5 Cheat Sheet </a:t>
             </a:r>
             <a:r>
               <a:rPr lang="en-US" sz="4000" i="1" dirty="0" smtClean="0"/>
@@ -4938,19 +4934,8 @@
                           <a:latin typeface="Consolas" pitchFamily="49" charset="0"/>
                           <a:cs typeface="Consolas" pitchFamily="49" charset="0"/>
                         </a:rPr>
-                        <a:t>h3 sub-sub title, </a:t>
-                      </a:r>
-                      <a:r>
-                        <a:rPr lang="en-US" sz="1050" b="1" baseline="0" dirty="0" smtClean="0">
-                          <a:latin typeface="Consolas" pitchFamily="49" charset="0"/>
-                          <a:cs typeface="Consolas" pitchFamily="49" charset="0"/>
-                        </a:rPr>
-                        <a:t>...</a:t>
-                      </a:r>
-                      <a:endParaRPr lang="en-US" sz="1050" b="1" baseline="0" dirty="0" smtClean="0">
-                        <a:latin typeface="Consolas" pitchFamily="49" charset="0"/>
-                        <a:cs typeface="Consolas" pitchFamily="49" charset="0"/>
-                      </a:endParaRPr>
+                        <a:t>h3 sub-sub title, ...</a:t>
+                      </a:r>
                     </a:p>
                   </a:txBody>
                   <a:tcPr/>
@@ -6453,14 +6438,6 @@
                         </a:rPr>
                         <a:t>&lt;form&gt;</a:t>
                       </a:r>
-                      <a:endParaRPr kumimoji="0" lang="en-US" sz="1050" b="1" kern="1200" dirty="0" smtClean="0">
-                        <a:solidFill>
-                          <a:schemeClr val="dk1"/>
-                        </a:solidFill>
-                        <a:latin typeface="Consolas" pitchFamily="49" charset="0"/>
-                        <a:ea typeface="+mn-ea"/>
-                        <a:cs typeface="Consolas" pitchFamily="49" charset="0"/>
-                      </a:endParaRPr>
                     </a:p>
                   </a:txBody>
                   <a:tcPr/>
@@ -6498,14 +6475,6 @@
                         </a:rPr>
                         <a:t>Form</a:t>
                       </a:r>
-                      <a:endParaRPr kumimoji="0" lang="en-US" sz="1050" b="1" kern="1200" dirty="0" smtClean="0">
-                        <a:solidFill>
-                          <a:schemeClr val="dk1"/>
-                        </a:solidFill>
-                        <a:latin typeface="Consolas" pitchFamily="49" charset="0"/>
-                        <a:ea typeface="+mn-ea"/>
-                        <a:cs typeface="Consolas" pitchFamily="49" charset="0"/>
-                      </a:endParaRPr>
                     </a:p>
                   </a:txBody>
                   <a:tcPr/>
@@ -6550,14 +6519,6 @@
                         </a:rPr>
                         <a:t>&gt;</a:t>
                       </a:r>
-                      <a:endParaRPr kumimoji="0" lang="en-US" sz="1050" b="1" kern="1200" dirty="0" smtClean="0">
-                        <a:solidFill>
-                          <a:schemeClr val="dk1"/>
-                        </a:solidFill>
-                        <a:latin typeface="Consolas" pitchFamily="49" charset="0"/>
-                        <a:ea typeface="+mn-ea"/>
-                        <a:cs typeface="Consolas" pitchFamily="49" charset="0"/>
-                      </a:endParaRPr>
                     </a:p>
                   </a:txBody>
                   <a:tcPr/>
@@ -6595,14 +6556,6 @@
                         </a:rPr>
                         <a:t>Collection of fields</a:t>
                       </a:r>
-                      <a:endParaRPr kumimoji="0" lang="en-US" sz="1050" b="1" kern="1200" dirty="0" smtClean="0">
-                        <a:solidFill>
-                          <a:schemeClr val="dk1"/>
-                        </a:solidFill>
-                        <a:latin typeface="Consolas" pitchFamily="49" charset="0"/>
-                        <a:ea typeface="+mn-ea"/>
-                        <a:cs typeface="Consolas" pitchFamily="49" charset="0"/>
-                      </a:endParaRPr>
                     </a:p>
                   </a:txBody>
                   <a:tcPr/>
@@ -6625,14 +6578,6 @@
                         </a:rPr>
                         <a:t>&lt;legend&gt;</a:t>
                       </a:r>
-                      <a:endParaRPr kumimoji="0" lang="en-US" sz="1050" b="1" kern="1200" dirty="0" smtClean="0">
-                        <a:solidFill>
-                          <a:schemeClr val="dk1"/>
-                        </a:solidFill>
-                        <a:latin typeface="Consolas" pitchFamily="49" charset="0"/>
-                        <a:ea typeface="+mn-ea"/>
-                        <a:cs typeface="Consolas" pitchFamily="49" charset="0"/>
-                      </a:endParaRPr>
                     </a:p>
                   </a:txBody>
                   <a:tcPr/>
@@ -6670,14 +6615,6 @@
                         </a:rPr>
                         <a:t>Form Legend</a:t>
                       </a:r>
-                      <a:endParaRPr kumimoji="0" lang="en-US" sz="1050" b="1" kern="1200" dirty="0" smtClean="0">
-                        <a:solidFill>
-                          <a:schemeClr val="dk1"/>
-                        </a:solidFill>
-                        <a:latin typeface="Consolas" pitchFamily="49" charset="0"/>
-                        <a:ea typeface="+mn-ea"/>
-                        <a:cs typeface="Consolas" pitchFamily="49" charset="0"/>
-                      </a:endParaRPr>
                     </a:p>
                   </a:txBody>
                   <a:tcPr/>
@@ -6730,10 +6667,6 @@
                         </a:rPr>
                         <a:t>Input Label</a:t>
                       </a:r>
-                      <a:endParaRPr lang="en-US" sz="1050" b="1" baseline="0" dirty="0" smtClean="0">
-                        <a:latin typeface="Consolas" pitchFamily="49" charset="0"/>
-                        <a:cs typeface="Consolas" pitchFamily="49" charset="0"/>
-                      </a:endParaRPr>
                     </a:p>
                   </a:txBody>
                   <a:tcPr/>
@@ -6786,10 +6719,6 @@
                         </a:rPr>
                         <a:t>Form input</a:t>
                       </a:r>
-                      <a:endParaRPr lang="en-US" sz="1050" b="1" baseline="0" dirty="0" smtClean="0">
-                        <a:latin typeface="Consolas" pitchFamily="49" charset="0"/>
-                        <a:cs typeface="Consolas" pitchFamily="49" charset="0"/>
-                      </a:endParaRPr>
                     </a:p>
                   </a:txBody>
                   <a:tcPr/>
@@ -6842,10 +6771,6 @@
                         </a:rPr>
                         <a:t>Drop-down box</a:t>
                       </a:r>
-                      <a:endParaRPr lang="en-US" sz="1050" b="1" baseline="0" dirty="0" smtClean="0">
-                        <a:latin typeface="Consolas" pitchFamily="49" charset="0"/>
-                        <a:cs typeface="Consolas" pitchFamily="49" charset="0"/>
-                      </a:endParaRPr>
                     </a:p>
                   </a:txBody>
                   <a:tcPr/>
@@ -6938,14 +6863,6 @@
                         </a:rPr>
                         <a:t>&lt;option&gt;</a:t>
                       </a:r>
-                      <a:endParaRPr kumimoji="0" lang="en-US" sz="1050" b="1" kern="1200" baseline="0" dirty="0" smtClean="0">
-                        <a:solidFill>
-                          <a:schemeClr val="dk1"/>
-                        </a:solidFill>
-                        <a:latin typeface="Consolas" pitchFamily="49" charset="0"/>
-                        <a:ea typeface="+mn-ea"/>
-                        <a:cs typeface="Consolas" pitchFamily="49" charset="0"/>
-                      </a:endParaRPr>
                     </a:p>
                   </a:txBody>
                   <a:tcPr/>
@@ -6979,10 +6896,6 @@
                         </a:rPr>
                         <a:t>Drop-down Options</a:t>
                       </a:r>
-                      <a:endParaRPr lang="en-US" sz="1050" b="1" dirty="0" smtClean="0">
-                        <a:latin typeface="Consolas" pitchFamily="49" charset="0"/>
-                        <a:cs typeface="Consolas" pitchFamily="49" charset="0"/>
-                      </a:endParaRPr>
                     </a:p>
                   </a:txBody>
                   <a:tcPr/>
@@ -7027,14 +6940,6 @@
                         </a:rPr>
                         <a:t>&gt;</a:t>
                       </a:r>
-                      <a:endParaRPr kumimoji="0" lang="en-US" sz="1050" b="1" kern="1200" baseline="0" dirty="0" smtClean="0">
-                        <a:solidFill>
-                          <a:schemeClr val="dk1"/>
-                        </a:solidFill>
-                        <a:latin typeface="Consolas" pitchFamily="49" charset="0"/>
-                        <a:ea typeface="+mn-ea"/>
-                        <a:cs typeface="Consolas" pitchFamily="49" charset="0"/>
-                      </a:endParaRPr>
                     </a:p>
                   </a:txBody>
                   <a:tcPr/>
@@ -7101,14 +7006,6 @@
                         </a:rPr>
                         <a:t>&lt;button&gt;</a:t>
                       </a:r>
-                      <a:endParaRPr kumimoji="0" lang="en-US" sz="1050" b="1" kern="1200" baseline="0" dirty="0" smtClean="0">
-                        <a:solidFill>
-                          <a:schemeClr val="dk1"/>
-                        </a:solidFill>
-                        <a:latin typeface="Consolas" pitchFamily="49" charset="0"/>
-                        <a:ea typeface="+mn-ea"/>
-                        <a:cs typeface="Consolas" pitchFamily="49" charset="0"/>
-                      </a:endParaRPr>
                     </a:p>
                   </a:txBody>
                   <a:tcPr/>
@@ -7142,10 +7039,6 @@
                         </a:rPr>
                         <a:t>Button</a:t>
                       </a:r>
-                      <a:endParaRPr lang="en-US" sz="1050" b="1" dirty="0" smtClean="0">
-                        <a:latin typeface="Consolas" pitchFamily="49" charset="0"/>
-                        <a:cs typeface="Consolas" pitchFamily="49" charset="0"/>
-                      </a:endParaRPr>
                     </a:p>
                   </a:txBody>
                   <a:tcPr/>
@@ -7224,6 +7117,113 @@
                         </a:rPr>
                         <a:t>&lt;span&gt;</a:t>
                       </a:r>
+                    </a:p>
+                  </a:txBody>
+                  <a:tcPr/>
+                </a:tc>
+                <a:tc>
+                  <a:txBody>
+                    <a:bodyPr/>
+                    <a:lstStyle/>
+                    <a:p>
+                      <a:pPr marL="0" marR="0" indent="0" algn="l" defTabSz="914400" rtl="0" eaLnBrk="1" fontAlgn="auto" latinLnBrk="0" hangingPunct="1">
+                        <a:lnSpc>
+                          <a:spcPct val="100000"/>
+                        </a:lnSpc>
+                        <a:spcBef>
+                          <a:spcPts val="0"/>
+                        </a:spcBef>
+                        <a:spcAft>
+                          <a:spcPts val="0"/>
+                        </a:spcAft>
+                        <a:buClrTx/>
+                        <a:buSzTx/>
+                        <a:buFontTx/>
+                        <a:buNone/>
+                        <a:tabLst/>
+                        <a:defRPr/>
+                      </a:pPr>
+                      <a:r>
+                        <a:rPr kumimoji="0" lang="en-US" sz="1050" b="1" kern="1200" dirty="0" smtClean="0">
+                          <a:solidFill>
+                            <a:schemeClr val="dk1"/>
+                          </a:solidFill>
+                          <a:latin typeface="Consolas" pitchFamily="49" charset="0"/>
+                          <a:ea typeface="+mn-ea"/>
+                          <a:cs typeface="Consolas" pitchFamily="49" charset="0"/>
+                        </a:rPr>
+                        <a:t>inline selection</a:t>
+                      </a:r>
+                    </a:p>
+                  </a:txBody>
+                  <a:tcPr/>
+                </a:tc>
+              </a:tr>
+              <a:tr h="256520">
+                <a:tc>
+                  <a:txBody>
+                    <a:bodyPr/>
+                    <a:lstStyle/>
+                    <a:p>
+                      <a:r>
+                        <a:rPr kumimoji="0" lang="en-US" sz="1050" b="1" kern="1200" dirty="0" smtClean="0">
+                          <a:solidFill>
+                            <a:schemeClr val="dk1"/>
+                          </a:solidFill>
+                          <a:latin typeface="Consolas" pitchFamily="49" charset="0"/>
+                          <a:ea typeface="+mn-ea"/>
+                          <a:cs typeface="Consolas" pitchFamily="49" charset="0"/>
+                        </a:rPr>
+                        <a:t>&lt;strong&gt;</a:t>
+                      </a:r>
+                    </a:p>
+                  </a:txBody>
+                  <a:tcPr/>
+                </a:tc>
+                <a:tc>
+                  <a:txBody>
+                    <a:bodyPr/>
+                    <a:lstStyle/>
+                    <a:p>
+                      <a:pPr marL="0" marR="0" indent="0" algn="l" defTabSz="914400" rtl="0" eaLnBrk="1" fontAlgn="auto" latinLnBrk="0" hangingPunct="1">
+                        <a:lnSpc>
+                          <a:spcPct val="100000"/>
+                        </a:lnSpc>
+                        <a:spcBef>
+                          <a:spcPts val="0"/>
+                        </a:spcBef>
+                        <a:spcAft>
+                          <a:spcPts val="0"/>
+                        </a:spcAft>
+                        <a:buClrTx/>
+                        <a:buSzTx/>
+                        <a:buFontTx/>
+                        <a:buNone/>
+                        <a:tabLst/>
+                        <a:defRPr/>
+                      </a:pPr>
+                      <a:r>
+                        <a:rPr kumimoji="0" lang="en-US" sz="1050" b="1" kern="1200" dirty="0" smtClean="0">
+                          <a:solidFill>
+                            <a:schemeClr val="dk1"/>
+                          </a:solidFill>
+                          <a:latin typeface="Consolas" pitchFamily="49" charset="0"/>
+                          <a:ea typeface="+mn-ea"/>
+                          <a:cs typeface="Consolas" pitchFamily="49" charset="0"/>
+                        </a:rPr>
+                        <a:t>bold (strong)</a:t>
+                      </a:r>
+                      <a:r>
+                        <a:rPr kumimoji="0" lang="en-US" sz="1050" b="1" kern="1200" baseline="0" dirty="0" smtClean="0">
+                          <a:solidFill>
+                            <a:schemeClr val="dk1"/>
+                          </a:solidFill>
+                          <a:latin typeface="Consolas" pitchFamily="49" charset="0"/>
+                          <a:ea typeface="+mn-ea"/>
+                          <a:cs typeface="Consolas" pitchFamily="49" charset="0"/>
+                        </a:rPr>
+                        <a:t> emphasis</a:t>
+                      </a:r>
                       <a:endParaRPr kumimoji="0" lang="en-US" sz="1050" b="1" kern="1200" dirty="0" smtClean="0">
                         <a:solidFill>
                           <a:schemeClr val="dk1"/>
@@ -7236,6 +7236,50 @@
                   </a:txBody>
                   <a:tcPr/>
                 </a:tc>
+              </a:tr>
+              <a:tr h="256520">
+                <a:tc>
+                  <a:txBody>
+                    <a:bodyPr/>
+                    <a:lstStyle/>
+                    <a:p>
+                      <a:r>
+                        <a:rPr kumimoji="0" lang="en-US" sz="1050" b="1" kern="1200" dirty="0" smtClean="0">
+                          <a:solidFill>
+                            <a:schemeClr val="dk1"/>
+                          </a:solidFill>
+                          <a:latin typeface="Consolas" pitchFamily="49" charset="0"/>
+                          <a:ea typeface="+mn-ea"/>
+                          <a:cs typeface="Consolas" pitchFamily="49" charset="0"/>
+                        </a:rPr>
+                        <a:t>&lt;</a:t>
+                      </a:r>
+                      <a:r>
+                        <a:rPr kumimoji="0" lang="en-US" sz="1050" b="1" kern="1200" dirty="0" err="1" smtClean="0">
+                          <a:solidFill>
+                            <a:schemeClr val="dk1"/>
+                          </a:solidFill>
+                          <a:latin typeface="Consolas" pitchFamily="49" charset="0"/>
+                          <a:ea typeface="+mn-ea"/>
+                          <a:cs typeface="Consolas" pitchFamily="49" charset="0"/>
+                        </a:rPr>
+                        <a:t>em</a:t>
+                      </a:r>
+                      <a:r>
+                        <a:rPr kumimoji="0" lang="en-US" sz="1050" b="1" kern="1200" dirty="0" smtClean="0">
+                          <a:solidFill>
+                            <a:schemeClr val="dk1"/>
+                          </a:solidFill>
+                          <a:latin typeface="Consolas" pitchFamily="49" charset="0"/>
+                          <a:ea typeface="+mn-ea"/>
+                          <a:cs typeface="Consolas" pitchFamily="49" charset="0"/>
+                        </a:rPr>
+                        <a:t>&gt;</a:t>
+                      </a:r>
+                    </a:p>
+                  </a:txBody>
+                  <a:tcPr/>
+                </a:tc>
                 <a:tc>
                   <a:txBody>
                     <a:bodyPr/>
@@ -7267,16 +7311,8 @@
                           <a:ea typeface="+mn-ea"/>
                           <a:cs typeface="Consolas" pitchFamily="49" charset="0"/>
                         </a:rPr>
-                        <a:t>inline selection</a:t>
-                      </a:r>
-                      <a:endParaRPr kumimoji="0" lang="en-US" sz="1050" b="1" kern="1200" dirty="0" smtClean="0">
-                        <a:solidFill>
-                          <a:schemeClr val="dk1"/>
-                        </a:solidFill>
-                        <a:latin typeface="Consolas" pitchFamily="49" charset="0"/>
-                        <a:ea typeface="+mn-ea"/>
-                        <a:cs typeface="Consolas" pitchFamily="49" charset="0"/>
-                      </a:endParaRPr>
+                        <a:t>italic emphasis</a:t>
+                      </a:r>
                     </a:p>
                   </a:txBody>
                   <a:tcPr/>
@@ -7289,24 +7325,27 @@
                     <a:lstStyle/>
                     <a:p>
                       <a:r>
-                        <a:rPr kumimoji="0" lang="en-US" sz="1050" b="1" kern="1200" dirty="0" smtClean="0">
-                          <a:solidFill>
-                            <a:schemeClr val="dk1"/>
-                          </a:solidFill>
-                          <a:latin typeface="Consolas" pitchFamily="49" charset="0"/>
-                          <a:ea typeface="+mn-ea"/>
-                          <a:cs typeface="Consolas" pitchFamily="49" charset="0"/>
-                        </a:rPr>
-                        <a:t>&lt;strong&gt;</a:t>
-                      </a:r>
-                      <a:endParaRPr kumimoji="0" lang="en-US" sz="1050" b="1" kern="1200" dirty="0" smtClean="0">
-                        <a:solidFill>
-                          <a:schemeClr val="dk1"/>
-                        </a:solidFill>
-                        <a:latin typeface="Consolas" pitchFamily="49" charset="0"/>
-                        <a:ea typeface="+mn-ea"/>
-                        <a:cs typeface="Consolas" pitchFamily="49" charset="0"/>
-                      </a:endParaRPr>
+                        <a:rPr lang="en-US" sz="1050" b="1" dirty="0" smtClean="0">
+                          <a:latin typeface="Consolas" pitchFamily="49" charset="0"/>
+                          <a:cs typeface="Consolas" pitchFamily="49" charset="0"/>
+                        </a:rPr>
+                        <a:t>&lt;</a:t>
+                      </a:r>
+                      <a:r>
+                        <a:rPr lang="en-US" sz="1050" b="1" dirty="0" err="1" smtClean="0">
+                          <a:latin typeface="Consolas" pitchFamily="49" charset="0"/>
+                          <a:cs typeface="Consolas" pitchFamily="49" charset="0"/>
+                        </a:rPr>
+                        <a:t>abbr</a:t>
+                      </a:r>
+                      <a:r>
+                        <a:rPr lang="en-US" sz="1050" b="1" dirty="0" smtClean="0">
+                          <a:latin typeface="Consolas" pitchFamily="49" charset="0"/>
+                          <a:cs typeface="Consolas" pitchFamily="49" charset="0"/>
+                        </a:rPr>
+                        <a:t>&gt;</a:t>
+                      </a:r>
+                      <a:endParaRPr lang="en-US" sz="1050" dirty="0"/>
                     </a:p>
                   </a:txBody>
                   <a:tcPr/>
@@ -7334,87 +7373,31 @@
                         <a:defRPr/>
                       </a:pPr>
                       <a:r>
-                        <a:rPr kumimoji="0" lang="en-US" sz="1050" b="1" kern="1200" dirty="0" smtClean="0">
-                          <a:solidFill>
-                            <a:schemeClr val="dk1"/>
-                          </a:solidFill>
-                          <a:latin typeface="Consolas" pitchFamily="49" charset="0"/>
-                          <a:ea typeface="+mn-ea"/>
-                          <a:cs typeface="Consolas" pitchFamily="49" charset="0"/>
-                        </a:rPr>
-                        <a:t>bold (strong)</a:t>
-                      </a:r>
-                      <a:r>
-                        <a:rPr kumimoji="0" lang="en-US" sz="1050" b="1" kern="1200" baseline="0" dirty="0" smtClean="0">
-                          <a:solidFill>
-                            <a:schemeClr val="dk1"/>
-                          </a:solidFill>
-                          <a:latin typeface="Consolas" pitchFamily="49" charset="0"/>
-                          <a:ea typeface="+mn-ea"/>
-                          <a:cs typeface="Consolas" pitchFamily="49" charset="0"/>
-                        </a:rPr>
-                        <a:t> emphasis</a:t>
-                      </a:r>
-                      <a:endParaRPr kumimoji="0" lang="en-US" sz="1050" b="1" kern="1200" dirty="0" smtClean="0">
-                        <a:solidFill>
-                          <a:schemeClr val="dk1"/>
-                        </a:solidFill>
-                        <a:latin typeface="Consolas" pitchFamily="49" charset="0"/>
-                        <a:ea typeface="+mn-ea"/>
-                        <a:cs typeface="Consolas" pitchFamily="49" charset="0"/>
-                      </a:endParaRPr>
+                        <a:rPr lang="en-US" sz="1050" b="1" baseline="0" dirty="0" smtClean="0">
+                          <a:latin typeface="Consolas" pitchFamily="49" charset="0"/>
+                          <a:cs typeface="Consolas" pitchFamily="49" charset="0"/>
+                        </a:rPr>
+                        <a:t>Abbreviation</a:t>
+                      </a:r>
                     </a:p>
                   </a:txBody>
                   <a:tcPr/>
                 </a:tc>
               </a:tr>
-              <a:tr h="256520">
-                <a:tc>
-                  <a:txBody>
-                    <a:bodyPr/>
-                    <a:lstStyle/>
-                    <a:p>
-                      <a:r>
-                        <a:rPr kumimoji="0" lang="en-US" sz="1050" b="1" kern="1200" dirty="0" smtClean="0">
-                          <a:solidFill>
-                            <a:schemeClr val="dk1"/>
-                          </a:solidFill>
-                          <a:latin typeface="Consolas" pitchFamily="49" charset="0"/>
-                          <a:ea typeface="+mn-ea"/>
-                          <a:cs typeface="Consolas" pitchFamily="49" charset="0"/>
-                        </a:rPr>
-                        <a:t>&lt;</a:t>
-                      </a:r>
-                      <a:r>
-                        <a:rPr kumimoji="0" lang="en-US" sz="1050" b="1" kern="1200" dirty="0" err="1" smtClean="0">
-                          <a:solidFill>
-                            <a:schemeClr val="dk1"/>
-                          </a:solidFill>
-                          <a:latin typeface="Consolas" pitchFamily="49" charset="0"/>
-                          <a:ea typeface="+mn-ea"/>
-                          <a:cs typeface="Consolas" pitchFamily="49" charset="0"/>
-                        </a:rPr>
-                        <a:t>em</a:t>
-                      </a:r>
-                      <a:r>
-                        <a:rPr kumimoji="0" lang="en-US" sz="1050" b="1" kern="1200" dirty="0" smtClean="0">
-                          <a:solidFill>
-                            <a:schemeClr val="dk1"/>
-                          </a:solidFill>
-                          <a:latin typeface="Consolas" pitchFamily="49" charset="0"/>
-                          <a:ea typeface="+mn-ea"/>
-                          <a:cs typeface="Consolas" pitchFamily="49" charset="0"/>
-                        </a:rPr>
-                        <a:t>&gt;</a:t>
-                      </a:r>
-                      <a:endParaRPr kumimoji="0" lang="en-US" sz="1050" b="1" kern="1200" dirty="0" smtClean="0">
-                        <a:solidFill>
-                          <a:schemeClr val="dk1"/>
-                        </a:solidFill>
-                        <a:latin typeface="Consolas" pitchFamily="49" charset="0"/>
-                        <a:ea typeface="+mn-ea"/>
-                        <a:cs typeface="Consolas" pitchFamily="49" charset="0"/>
-                      </a:endParaRPr>
+              <a:tr h="141879">
+                <a:tc>
+                  <a:txBody>
+                    <a:bodyPr/>
+                    <a:lstStyle/>
+                    <a:p>
+                      <a:r>
+                        <a:rPr lang="en-US" sz="1050" b="1" baseline="0" dirty="0" smtClean="0">
+                          <a:latin typeface="Consolas" pitchFamily="49" charset="0"/>
+                          <a:cs typeface="Consolas" pitchFamily="49" charset="0"/>
+                        </a:rPr>
+                        <a:t>&lt;q&gt;</a:t>
+                      </a:r>
+                      <a:endParaRPr lang="en-US" sz="1050" dirty="0"/>
                     </a:p>
                   </a:txBody>
                   <a:tcPr/>
@@ -7442,24 +7425,12 @@
                         <a:defRPr/>
                       </a:pPr>
                       <a:r>
-                        <a:rPr kumimoji="0" lang="en-US" sz="1050" b="1" kern="1200" dirty="0" smtClean="0">
-                          <a:solidFill>
-                            <a:schemeClr val="dk1"/>
-                          </a:solidFill>
-                          <a:latin typeface="Consolas" pitchFamily="49" charset="0"/>
-                          <a:ea typeface="+mn-ea"/>
-                          <a:cs typeface="Consolas" pitchFamily="49" charset="0"/>
-                        </a:rPr>
-                        <a:t>italic emphasis</a:t>
-                      </a:r>
-                      <a:endParaRPr kumimoji="0" lang="en-US" sz="1050" b="1" kern="1200" dirty="0" smtClean="0">
-                        <a:solidFill>
-                          <a:schemeClr val="dk1"/>
-                        </a:solidFill>
-                        <a:latin typeface="Consolas" pitchFamily="49" charset="0"/>
-                        <a:ea typeface="+mn-ea"/>
-                        <a:cs typeface="Consolas" pitchFamily="49" charset="0"/>
-                      </a:endParaRPr>
+                        <a:rPr lang="en-US" sz="1050" b="1" baseline="0" dirty="0" smtClean="0">
+                          <a:latin typeface="Consolas" pitchFamily="49" charset="0"/>
+                          <a:cs typeface="Consolas" pitchFamily="49" charset="0"/>
+                        </a:rPr>
+                        <a:t>Short Quotation</a:t>
+                      </a:r>
                     </a:p>
                   </a:txBody>
                   <a:tcPr/>
@@ -7472,25 +7443,11 @@
                     <a:lstStyle/>
                     <a:p>
                       <a:r>
-                        <a:rPr lang="en-US" sz="1050" b="1" dirty="0" smtClean="0">
-                          <a:latin typeface="Consolas" pitchFamily="49" charset="0"/>
-                          <a:cs typeface="Consolas" pitchFamily="49" charset="0"/>
-                        </a:rPr>
-                        <a:t>&lt;</a:t>
-                      </a:r>
-                      <a:r>
-                        <a:rPr lang="en-US" sz="1050" b="1" dirty="0" err="1" smtClean="0">
-                          <a:latin typeface="Consolas" pitchFamily="49" charset="0"/>
-                          <a:cs typeface="Consolas" pitchFamily="49" charset="0"/>
-                        </a:rPr>
-                        <a:t>abbr</a:t>
-                      </a:r>
-                      <a:r>
-                        <a:rPr lang="en-US" sz="1050" b="1" dirty="0" smtClean="0">
-                          <a:latin typeface="Consolas" pitchFamily="49" charset="0"/>
-                          <a:cs typeface="Consolas" pitchFamily="49" charset="0"/>
-                        </a:rPr>
-                        <a:t>&gt;</a:t>
+                        <a:rPr lang="en-US" sz="1050" b="1" baseline="0" dirty="0" smtClean="0">
+                          <a:latin typeface="Consolas" pitchFamily="49" charset="0"/>
+                          <a:cs typeface="Consolas" pitchFamily="49" charset="0"/>
+                        </a:rPr>
+                        <a:t>&lt;address&gt;</a:t>
                       </a:r>
                       <a:endParaRPr lang="en-US" sz="1050" dirty="0"/>
                     </a:p>
@@ -7524,18 +7481,14 @@
                           <a:latin typeface="Consolas" pitchFamily="49" charset="0"/>
                           <a:cs typeface="Consolas" pitchFamily="49" charset="0"/>
                         </a:rPr>
-                        <a:t>Abbreviation</a:t>
-                      </a:r>
-                      <a:endParaRPr lang="en-US" sz="1050" b="1" baseline="0" dirty="0" smtClean="0">
-                        <a:latin typeface="Consolas" pitchFamily="49" charset="0"/>
-                        <a:cs typeface="Consolas" pitchFamily="49" charset="0"/>
-                      </a:endParaRPr>
+                        <a:t>Address</a:t>
+                      </a:r>
                     </a:p>
                   </a:txBody>
                   <a:tcPr/>
                 </a:tc>
               </a:tr>
-              <a:tr h="141879">
+              <a:tr h="256520">
                 <a:tc>
                   <a:txBody>
                     <a:bodyPr/>
@@ -7546,7 +7499,7 @@
                           <a:latin typeface="Consolas" pitchFamily="49" charset="0"/>
                           <a:cs typeface="Consolas" pitchFamily="49" charset="0"/>
                         </a:rPr>
-                        <a:t>&lt;q&gt;</a:t>
+                        <a:t>&lt;pre&gt;</a:t>
                       </a:r>
                       <a:endParaRPr lang="en-US" sz="1050" dirty="0"/>
                     </a:p>
@@ -7580,9 +7533,9 @@
                           <a:latin typeface="Consolas" pitchFamily="49" charset="0"/>
                           <a:cs typeface="Consolas" pitchFamily="49" charset="0"/>
                         </a:rPr>
-                        <a:t>Short Quotation</a:t>
-                      </a:r>
-                      <a:endParaRPr lang="en-US" sz="1050" b="1" baseline="0" dirty="0" smtClean="0">
+                        <a:t>Preformatted text</a:t>
+                      </a:r>
+                      <a:endParaRPr lang="en-US" sz="1050" b="1" dirty="0" smtClean="0">
                         <a:latin typeface="Consolas" pitchFamily="49" charset="0"/>
                         <a:cs typeface="Consolas" pitchFamily="49" charset="0"/>
                       </a:endParaRPr>
@@ -7598,13 +7551,16 @@
                     <a:lstStyle/>
                     <a:p>
                       <a:r>
-                        <a:rPr lang="en-US" sz="1050" b="1" baseline="0" dirty="0" smtClean="0">
-                          <a:latin typeface="Consolas" pitchFamily="49" charset="0"/>
-                          <a:cs typeface="Consolas" pitchFamily="49" charset="0"/>
-                        </a:rPr>
-                        <a:t>&lt;address&gt;</a:t>
-                      </a:r>
-                      <a:endParaRPr lang="en-US" sz="1050" dirty="0"/>
+                        <a:rPr kumimoji="0" lang="en-US" sz="1050" b="1" kern="1200" baseline="0" dirty="0" smtClean="0">
+                          <a:solidFill>
+                            <a:schemeClr val="dk1"/>
+                          </a:solidFill>
+                          <a:latin typeface="Consolas" pitchFamily="49" charset="0"/>
+                          <a:ea typeface="+mn-ea"/>
+                          <a:cs typeface="Consolas" pitchFamily="49" charset="0"/>
+                        </a:rPr>
+                        <a:t>&lt;code&gt;</a:t>
+                      </a:r>
                     </a:p>
                   </a:txBody>
                   <a:tcPr/>
@@ -7632,35 +7588,34 @@
                         <a:defRPr/>
                       </a:pPr>
                       <a:r>
-                        <a:rPr lang="en-US" sz="1050" b="1" baseline="0" dirty="0" smtClean="0">
-                          <a:latin typeface="Consolas" pitchFamily="49" charset="0"/>
-                          <a:cs typeface="Consolas" pitchFamily="49" charset="0"/>
-                        </a:rPr>
-                        <a:t>Address</a:t>
-                      </a:r>
-                      <a:endParaRPr lang="en-US" sz="1050" b="1" baseline="0" dirty="0" smtClean="0">
-                        <a:latin typeface="Consolas" pitchFamily="49" charset="0"/>
-                        <a:cs typeface="Consolas" pitchFamily="49" charset="0"/>
-                      </a:endParaRPr>
+                        <a:rPr lang="en-US" sz="1050" b="1" dirty="0" smtClean="0">
+                          <a:latin typeface="Consolas" pitchFamily="49" charset="0"/>
+                          <a:cs typeface="Consolas" pitchFamily="49" charset="0"/>
+                        </a:rPr>
+                        <a:t>Code</a:t>
+                      </a:r>
                     </a:p>
                   </a:txBody>
                   <a:tcPr/>
                 </a:tc>
               </a:tr>
-              <a:tr h="256520">
-                <a:tc>
-                  <a:txBody>
-                    <a:bodyPr/>
-                    <a:lstStyle/>
-                    <a:p>
-                      <a:r>
-                        <a:rPr lang="en-US" sz="1050" b="1" baseline="0" dirty="0" smtClean="0">
-                          <a:latin typeface="Consolas" pitchFamily="49" charset="0"/>
-                          <a:cs typeface="Consolas" pitchFamily="49" charset="0"/>
-                        </a:rPr>
-                        <a:t>&lt;pre&gt;</a:t>
-                      </a:r>
-                      <a:endParaRPr lang="en-US" sz="1050" dirty="0"/>
+              <a:tr h="258803">
+                <a:tc>
+                  <a:txBody>
+                    <a:bodyPr/>
+                    <a:lstStyle/>
+                    <a:p>
+                      <a:r>
+                        <a:rPr kumimoji="0" lang="en-US" sz="1050" b="1" kern="1200" baseline="0" dirty="0" smtClean="0">
+                          <a:solidFill>
+                            <a:schemeClr val="dk1"/>
+                          </a:solidFill>
+                          <a:latin typeface="Consolas" pitchFamily="49" charset="0"/>
+                          <a:ea typeface="+mn-ea"/>
+                          <a:cs typeface="Consolas" pitchFamily="49" charset="0"/>
+                        </a:rPr>
+                        <a:t>&lt;cite&gt;</a:t>
+                      </a:r>
                     </a:p>
                   </a:txBody>
                   <a:tcPr/>
@@ -7688,150 +7643,12 @@
                         <a:defRPr/>
                       </a:pPr>
                       <a:r>
-                        <a:rPr lang="en-US" sz="1050" b="1" baseline="0" dirty="0" smtClean="0">
-                          <a:latin typeface="Consolas" pitchFamily="49" charset="0"/>
-                          <a:cs typeface="Consolas" pitchFamily="49" charset="0"/>
-                        </a:rPr>
-                        <a:t>Preformatted text</a:t>
-                      </a:r>
-                      <a:endParaRPr lang="en-US" sz="1050" b="1" dirty="0" smtClean="0">
-                        <a:latin typeface="Consolas" pitchFamily="49" charset="0"/>
-                        <a:cs typeface="Consolas" pitchFamily="49" charset="0"/>
-                      </a:endParaRPr>
-                    </a:p>
-                  </a:txBody>
-                  <a:tcPr/>
-                </a:tc>
-              </a:tr>
-              <a:tr h="256520">
-                <a:tc>
-                  <a:txBody>
-                    <a:bodyPr/>
-                    <a:lstStyle/>
-                    <a:p>
-                      <a:r>
-                        <a:rPr kumimoji="0" lang="en-US" sz="1050" b="1" kern="1200" baseline="0" dirty="0" smtClean="0">
-                          <a:solidFill>
-                            <a:schemeClr val="dk1"/>
-                          </a:solidFill>
-                          <a:latin typeface="Consolas" pitchFamily="49" charset="0"/>
-                          <a:ea typeface="+mn-ea"/>
-                          <a:cs typeface="Consolas" pitchFamily="49" charset="0"/>
-                        </a:rPr>
-                        <a:t>&lt;code&gt;</a:t>
-                      </a:r>
-                      <a:endParaRPr kumimoji="0" lang="en-US" sz="1050" b="1" kern="1200" baseline="0" dirty="0" smtClean="0">
-                        <a:solidFill>
-                          <a:schemeClr val="dk1"/>
-                        </a:solidFill>
-                        <a:latin typeface="Consolas" pitchFamily="49" charset="0"/>
-                        <a:ea typeface="+mn-ea"/>
-                        <a:cs typeface="Consolas" pitchFamily="49" charset="0"/>
-                      </a:endParaRPr>
-                    </a:p>
-                  </a:txBody>
-                  <a:tcPr/>
-                </a:tc>
-                <a:tc>
-                  <a:txBody>
-                    <a:bodyPr/>
-                    <a:lstStyle/>
-                    <a:p>
-                      <a:pPr marL="0" marR="0" indent="0" algn="l" defTabSz="914400" rtl="0" eaLnBrk="1" fontAlgn="auto" latinLnBrk="0" hangingPunct="1">
-                        <a:lnSpc>
-                          <a:spcPct val="100000"/>
-                        </a:lnSpc>
-                        <a:spcBef>
-                          <a:spcPts val="0"/>
-                        </a:spcBef>
-                        <a:spcAft>
-                          <a:spcPts val="0"/>
-                        </a:spcAft>
-                        <a:buClrTx/>
-                        <a:buSzTx/>
-                        <a:buFontTx/>
-                        <a:buNone/>
-                        <a:tabLst/>
-                        <a:defRPr/>
-                      </a:pPr>
-                      <a:r>
                         <a:rPr lang="en-US" sz="1050" b="1" dirty="0" smtClean="0">
                           <a:latin typeface="Consolas" pitchFamily="49" charset="0"/>
                           <a:cs typeface="Consolas" pitchFamily="49" charset="0"/>
                         </a:rPr>
-                        <a:t>Code</a:t>
-                      </a:r>
-                      <a:endParaRPr lang="en-US" sz="1050" b="1" dirty="0" smtClean="0">
-                        <a:latin typeface="Consolas" pitchFamily="49" charset="0"/>
-                        <a:cs typeface="Consolas" pitchFamily="49" charset="0"/>
-                      </a:endParaRPr>
-                    </a:p>
-                  </a:txBody>
-                  <a:tcPr/>
-                </a:tc>
-              </a:tr>
-              <a:tr h="258803">
-                <a:tc>
-                  <a:txBody>
-                    <a:bodyPr/>
-                    <a:lstStyle/>
-                    <a:p>
-                      <a:r>
-                        <a:rPr kumimoji="0" lang="en-US" sz="1050" b="1" kern="1200" baseline="0" dirty="0" smtClean="0">
-                          <a:solidFill>
-                            <a:schemeClr val="dk1"/>
-                          </a:solidFill>
-                          <a:latin typeface="Consolas" pitchFamily="49" charset="0"/>
-                          <a:ea typeface="+mn-ea"/>
-                          <a:cs typeface="Consolas" pitchFamily="49" charset="0"/>
-                        </a:rPr>
-                        <a:t>&lt;cite&gt;</a:t>
-                      </a:r>
-                      <a:endParaRPr kumimoji="0" lang="en-US" sz="1050" b="1" kern="1200" baseline="0" dirty="0" smtClean="0">
-                        <a:solidFill>
-                          <a:schemeClr val="dk1"/>
-                        </a:solidFill>
-                        <a:latin typeface="Consolas" pitchFamily="49" charset="0"/>
-                        <a:ea typeface="+mn-ea"/>
-                        <a:cs typeface="Consolas" pitchFamily="49" charset="0"/>
-                      </a:endParaRPr>
-                    </a:p>
-                  </a:txBody>
-                  <a:tcPr/>
-                </a:tc>
-                <a:tc>
-                  <a:txBody>
-                    <a:bodyPr/>
-                    <a:lstStyle/>
-                    <a:p>
-                      <a:pPr marL="0" marR="0" indent="0" algn="l" defTabSz="914400" rtl="0" eaLnBrk="1" fontAlgn="auto" latinLnBrk="0" hangingPunct="1">
-                        <a:lnSpc>
-                          <a:spcPct val="100000"/>
-                        </a:lnSpc>
-                        <a:spcBef>
-                          <a:spcPts val="0"/>
-                        </a:spcBef>
-                        <a:spcAft>
-                          <a:spcPts val="0"/>
-                        </a:spcAft>
-                        <a:buClrTx/>
-                        <a:buSzTx/>
-                        <a:buFontTx/>
-                        <a:buNone/>
-                        <a:tabLst/>
-                        <a:defRPr/>
-                      </a:pPr>
-                      <a:r>
-                        <a:rPr lang="en-US" sz="1050" b="1" dirty="0" smtClean="0">
-                          <a:latin typeface="Consolas" pitchFamily="49" charset="0"/>
-                          <a:cs typeface="Consolas" pitchFamily="49" charset="0"/>
-                        </a:rPr>
                         <a:t>Citation</a:t>
                       </a:r>
-                      <a:endParaRPr lang="en-US" sz="1050" b="1" dirty="0" smtClean="0">
-                        <a:latin typeface="Consolas" pitchFamily="49" charset="0"/>
-                        <a:cs typeface="Consolas" pitchFamily="49" charset="0"/>
-                      </a:endParaRPr>
                     </a:p>
                   </a:txBody>
                   <a:tcPr/>
@@ -8021,11 +7838,7 @@
           <a:p>
             <a:r>
               <a:rPr lang="en-US" dirty="0" smtClean="0"/>
-              <a:t>HTML5 Cheat </a:t>
-            </a:r>
-            <a:r>
-              <a:rPr lang="en-US" dirty="0" smtClean="0"/>
-              <a:t>Sheet </a:t>
+              <a:t>HTML5 Cheat Sheet </a:t>
             </a:r>
             <a:r>
               <a:rPr lang="en-US" sz="4000" i="1" dirty="0" smtClean="0"/>
@@ -8041,11 +7854,17 @@
           <p:cNvGraphicFramePr>
             <a:graphicFrameLocks noGrp="1"/>
           </p:cNvGraphicFramePr>
-          <p:nvPr/>
+          <p:nvPr>
+            <p:extLst>
+              <p:ext uri="{D42A27DB-BD31-4B8C-83A1-F6EECF244321}">
+                <p14:modId xmlns:p14="http://schemas.microsoft.com/office/powerpoint/2010/main" val="2396571994"/>
+              </p:ext>
+            </p:extLst>
+          </p:nvPr>
         </p:nvGraphicFramePr>
         <p:xfrm>
-          <a:off x="5638800" y="533401"/>
-          <a:ext cx="3429000" cy="3207084"/>
+          <a:off x="228600" y="762000"/>
+          <a:ext cx="4038600" cy="3397584"/>
         </p:xfrm>
         <a:graphic>
           <a:graphicData uri="http://schemas.openxmlformats.org/drawingml/2006/table">
@@ -8054,8 +7873,8 @@
                 <a:tableStyleId>{5C22544A-7EE6-4342-B048-85BDC9FD1C3A}</a:tableStyleId>
               </a:tblPr>
               <a:tblGrid>
-                <a:gridCol w="1143000"/>
-                <a:gridCol w="2286000"/>
+                <a:gridCol w="1295400"/>
+                <a:gridCol w="2743200"/>
               </a:tblGrid>
               <a:tr h="247316">
                 <a:tc gridSpan="2">
@@ -8064,14 +7883,10 @@
                     <a:lstStyle/>
                     <a:p>
                       <a:r>
-                        <a:rPr lang="en-US" sz="1200" dirty="0" smtClean="0"/>
-                        <a:t>Page Layout (</a:t>
-                      </a:r>
-                      <a:r>
-                        <a:rPr lang="en-US" sz="1200" dirty="0" smtClean="0"/>
-                        <a:t>structure)</a:t>
-                      </a:r>
-                      <a:endParaRPr lang="en-US" sz="1200" dirty="0"/>
+                        <a:rPr lang="en-US" sz="1600" dirty="0" smtClean="0"/>
+                        <a:t>Page Layout (structure)</a:t>
+                      </a:r>
+                      <a:endParaRPr lang="en-US" sz="1600" dirty="0"/>
                     </a:p>
                   </a:txBody>
                   <a:tcPr>
@@ -8098,7 +7913,7 @@
                     <a:lstStyle/>
                     <a:p>
                       <a:r>
-                        <a:rPr kumimoji="0" lang="en-US" sz="1050" b="1" kern="1200" dirty="0" smtClean="0">
+                        <a:rPr kumimoji="0" lang="en-US" sz="1200" b="1" kern="1200" dirty="0" smtClean="0">
                           <a:solidFill>
                             <a:schemeClr val="dk1"/>
                           </a:solidFill>
@@ -8135,7 +7950,7 @@
                         <a:defRPr/>
                       </a:pPr>
                       <a:r>
-                        <a:rPr kumimoji="0" lang="en-US" sz="1050" b="1" kern="1200" dirty="0" smtClean="0">
+                        <a:rPr kumimoji="0" lang="en-US" sz="1200" b="1" kern="1200" dirty="0" smtClean="0">
                           <a:solidFill>
                             <a:schemeClr val="dk1"/>
                           </a:solidFill>
@@ -8157,7 +7972,7 @@
                     <a:lstStyle/>
                     <a:p>
                       <a:r>
-                        <a:rPr kumimoji="0" lang="en-US" sz="1050" b="1" kern="1200" dirty="0" smtClean="0">
+                        <a:rPr kumimoji="0" lang="en-US" sz="1200" b="1" kern="1200" dirty="0" smtClean="0">
                           <a:solidFill>
                             <a:schemeClr val="dk1"/>
                           </a:solidFill>
@@ -8168,7 +7983,7 @@
                         <a:t>&lt;</a:t>
                       </a:r>
                       <a:r>
-                        <a:rPr kumimoji="0" lang="en-US" sz="1050" b="1" kern="1200" dirty="0" err="1" smtClean="0">
+                        <a:rPr kumimoji="0" lang="en-US" sz="1200" b="1" kern="1200" dirty="0" err="1" smtClean="0">
                           <a:solidFill>
                             <a:schemeClr val="dk1"/>
                           </a:solidFill>
@@ -8179,7 +7994,7 @@
                         <a:t>hgroup</a:t>
                       </a:r>
                       <a:r>
-                        <a:rPr kumimoji="0" lang="en-US" sz="1050" b="1" kern="1200" dirty="0" smtClean="0">
+                        <a:rPr kumimoji="0" lang="en-US" sz="1200" b="1" kern="1200" dirty="0" smtClean="0">
                           <a:solidFill>
                             <a:schemeClr val="dk1"/>
                           </a:solidFill>
@@ -8189,14 +8004,6 @@
                         </a:rPr>
                         <a:t>&gt;</a:t>
                       </a:r>
-                      <a:endParaRPr kumimoji="0" lang="en-US" sz="1050" b="1" kern="1200" dirty="0" smtClean="0">
-                        <a:solidFill>
-                          <a:schemeClr val="dk1"/>
-                        </a:solidFill>
-                        <a:latin typeface="Consolas" pitchFamily="49" charset="0"/>
-                        <a:ea typeface="+mn-ea"/>
-                        <a:cs typeface="Consolas" pitchFamily="49" charset="0"/>
-                      </a:endParaRPr>
                     </a:p>
                   </a:txBody>
                   <a:tcPr/>
@@ -8224,7 +8031,7 @@
                         <a:defRPr/>
                       </a:pPr>
                       <a:r>
-                        <a:rPr kumimoji="0" lang="en-US" sz="1050" b="1" kern="1200" dirty="0" smtClean="0">
+                        <a:rPr kumimoji="0" lang="en-US" sz="1200" b="1" kern="1200" dirty="0" smtClean="0">
                           <a:solidFill>
                             <a:schemeClr val="dk1"/>
                           </a:solidFill>
@@ -8235,7 +8042,7 @@
                         <a:t>Group of headings</a:t>
                       </a:r>
                       <a:r>
-                        <a:rPr kumimoji="0" lang="en-US" sz="1050" b="1" kern="1200" baseline="0" dirty="0" smtClean="0">
+                        <a:rPr kumimoji="0" lang="en-US" sz="1200" b="1" kern="1200" baseline="0" dirty="0" smtClean="0">
                           <a:solidFill>
                             <a:schemeClr val="dk1"/>
                           </a:solidFill>
@@ -8245,7 +8052,7 @@
                         </a:rPr>
                         <a:t> for a section</a:t>
                       </a:r>
-                      <a:endParaRPr kumimoji="0" lang="en-US" sz="1050" b="1" kern="1200" dirty="0" smtClean="0">
+                      <a:endParaRPr kumimoji="0" lang="en-US" sz="1200" b="1" kern="1200" dirty="0" smtClean="0">
                         <a:solidFill>
                           <a:schemeClr val="dk1"/>
                         </a:solidFill>
@@ -8265,7 +8072,7 @@
                     <a:lstStyle/>
                     <a:p>
                       <a:r>
-                        <a:rPr kumimoji="0" lang="en-US" sz="1050" b="1" kern="1200" dirty="0" smtClean="0">
+                        <a:rPr kumimoji="0" lang="en-US" sz="1200" b="1" kern="1200" dirty="0" smtClean="0">
                           <a:solidFill>
                             <a:schemeClr val="dk1"/>
                           </a:solidFill>
@@ -8276,7 +8083,7 @@
                         <a:t>&lt;</a:t>
                       </a:r>
                       <a:r>
-                        <a:rPr kumimoji="0" lang="en-US" sz="1050" b="1" kern="1200" dirty="0" err="1" smtClean="0">
+                        <a:rPr kumimoji="0" lang="en-US" sz="1200" b="1" kern="1200" dirty="0" err="1" smtClean="0">
                           <a:solidFill>
                             <a:schemeClr val="dk1"/>
                           </a:solidFill>
@@ -8287,7 +8094,7 @@
                         <a:t>nav</a:t>
                       </a:r>
                       <a:r>
-                        <a:rPr kumimoji="0" lang="en-US" sz="1050" b="1" kern="1200" dirty="0" smtClean="0">
+                        <a:rPr kumimoji="0" lang="en-US" sz="1200" b="1" kern="1200" dirty="0" smtClean="0">
                           <a:solidFill>
                             <a:schemeClr val="dk1"/>
                           </a:solidFill>
@@ -8324,7 +8131,7 @@
                         <a:defRPr/>
                       </a:pPr>
                       <a:r>
-                        <a:rPr kumimoji="0" lang="en-US" sz="1050" b="1" kern="1200" dirty="0" smtClean="0">
+                        <a:rPr kumimoji="0" lang="en-US" sz="1200" b="1" kern="1200" dirty="0" smtClean="0">
                           <a:solidFill>
                             <a:schemeClr val="dk1"/>
                           </a:solidFill>
@@ -8346,13 +8153,13 @@
                     <a:lstStyle/>
                     <a:p>
                       <a:r>
-                        <a:rPr lang="en-US" sz="1050" b="1" dirty="0" smtClean="0">
+                        <a:rPr lang="en-US" sz="1200" b="1" dirty="0" smtClean="0">
                           <a:latin typeface="Consolas" pitchFamily="49" charset="0"/>
                           <a:cs typeface="Consolas" pitchFamily="49" charset="0"/>
                         </a:rPr>
                         <a:t>&lt;section&gt;</a:t>
                       </a:r>
-                      <a:endParaRPr lang="en-US" sz="1050" dirty="0"/>
+                      <a:endParaRPr lang="en-US" sz="1200" dirty="0"/>
                     </a:p>
                   </a:txBody>
                   <a:tcPr/>
@@ -8380,7 +8187,7 @@
                         <a:defRPr/>
                       </a:pPr>
                       <a:r>
-                        <a:rPr lang="en-US" sz="1050" b="1" baseline="0" dirty="0" smtClean="0">
+                        <a:rPr lang="en-US" sz="1200" b="1" baseline="0" dirty="0" smtClean="0">
                           <a:latin typeface="Consolas" pitchFamily="49" charset="0"/>
                           <a:cs typeface="Consolas" pitchFamily="49" charset="0"/>
                         </a:rPr>
@@ -8398,13 +8205,13 @@
                     <a:lstStyle/>
                     <a:p>
                       <a:r>
-                        <a:rPr lang="en-US" sz="1050" b="1" baseline="0" dirty="0" smtClean="0">
+                        <a:rPr lang="en-US" sz="1200" b="1" baseline="0" dirty="0" smtClean="0">
                           <a:latin typeface="Consolas" pitchFamily="49" charset="0"/>
                           <a:cs typeface="Consolas" pitchFamily="49" charset="0"/>
                         </a:rPr>
                         <a:t>&lt;article&gt;</a:t>
                       </a:r>
-                      <a:endParaRPr lang="en-US" sz="1050" dirty="0"/>
+                      <a:endParaRPr lang="en-US" sz="1200" dirty="0"/>
                     </a:p>
                   </a:txBody>
                   <a:tcPr/>
@@ -8432,7 +8239,7 @@
                         <a:defRPr/>
                       </a:pPr>
                       <a:r>
-                        <a:rPr lang="en-US" sz="1050" b="1" baseline="0" dirty="0" smtClean="0">
+                        <a:rPr lang="en-US" sz="1200" b="1" baseline="0" dirty="0" smtClean="0">
                           <a:latin typeface="Consolas" pitchFamily="49" charset="0"/>
                           <a:cs typeface="Consolas" pitchFamily="49" charset="0"/>
                         </a:rPr>
@@ -8450,13 +8257,13 @@
                     <a:lstStyle/>
                     <a:p>
                       <a:r>
-                        <a:rPr lang="en-US" sz="1050" b="1" baseline="0" dirty="0" smtClean="0">
+                        <a:rPr lang="en-US" sz="1200" b="1" baseline="0" dirty="0" smtClean="0">
                           <a:latin typeface="Consolas" pitchFamily="49" charset="0"/>
                           <a:cs typeface="Consolas" pitchFamily="49" charset="0"/>
                         </a:rPr>
                         <a:t>&lt;aside&gt;</a:t>
                       </a:r>
-                      <a:endParaRPr lang="en-US" sz="1050" dirty="0"/>
+                      <a:endParaRPr lang="en-US" sz="1200" dirty="0"/>
                     </a:p>
                   </a:txBody>
                   <a:tcPr/>
@@ -8484,7 +8291,7 @@
                         <a:defRPr/>
                       </a:pPr>
                       <a:r>
-                        <a:rPr lang="en-US" sz="1050" b="1" baseline="0" dirty="0" smtClean="0">
+                        <a:rPr lang="en-US" sz="1200" b="1" baseline="0" dirty="0" smtClean="0">
                           <a:latin typeface="Consolas" pitchFamily="49" charset="0"/>
                           <a:cs typeface="Consolas" pitchFamily="49" charset="0"/>
                         </a:rPr>
@@ -8502,13 +8309,13 @@
                     <a:lstStyle/>
                     <a:p>
                       <a:r>
-                        <a:rPr lang="en-US" sz="1050" b="1" baseline="0" dirty="0" smtClean="0">
+                        <a:rPr lang="en-US" sz="1200" b="1" baseline="0" dirty="0" smtClean="0">
                           <a:latin typeface="Consolas" pitchFamily="49" charset="0"/>
                           <a:cs typeface="Consolas" pitchFamily="49" charset="0"/>
                         </a:rPr>
                         <a:t>&lt;figure&gt;</a:t>
                       </a:r>
-                      <a:endParaRPr lang="en-US" sz="1050" dirty="0"/>
+                      <a:endParaRPr lang="en-US" sz="1200" dirty="0"/>
                     </a:p>
                   </a:txBody>
                   <a:tcPr/>
@@ -8536,13 +8343,13 @@
                         <a:defRPr/>
                       </a:pPr>
                       <a:r>
-                        <a:rPr lang="en-US" sz="1050" b="1" baseline="0" dirty="0" smtClean="0">
+                        <a:rPr lang="en-US" sz="1200" b="1" baseline="0" dirty="0" smtClean="0">
                           <a:latin typeface="Consolas" pitchFamily="49" charset="0"/>
                           <a:cs typeface="Consolas" pitchFamily="49" charset="0"/>
                         </a:rPr>
                         <a:t>diagrams, illustrations, etc.</a:t>
                       </a:r>
-                      <a:endParaRPr lang="en-US" sz="1050" b="1" dirty="0" smtClean="0">
+                      <a:endParaRPr lang="en-US" sz="1200" b="1" dirty="0" smtClean="0">
                         <a:latin typeface="Consolas" pitchFamily="49" charset="0"/>
                         <a:cs typeface="Consolas" pitchFamily="49" charset="0"/>
                       </a:endParaRPr>
@@ -8551,14 +8358,14 @@
                   <a:tcPr/>
                 </a:tc>
               </a:tr>
-              <a:tr h="210218">
-                <a:tc>
-                  <a:txBody>
-                    <a:bodyPr/>
-                    <a:lstStyle/>
-                    <a:p>
-                      <a:r>
-                        <a:rPr kumimoji="0" lang="en-US" sz="1050" b="1" kern="1200" baseline="0" dirty="0" smtClean="0">
+              <a:tr h="286218">
+                <a:tc>
+                  <a:txBody>
+                    <a:bodyPr/>
+                    <a:lstStyle/>
+                    <a:p>
+                      <a:r>
+                        <a:rPr kumimoji="0" lang="en-US" sz="1200" b="1" kern="1200" baseline="0" dirty="0" smtClean="0">
                           <a:solidFill>
                             <a:schemeClr val="dk1"/>
                           </a:solidFill>
@@ -8569,7 +8376,7 @@
                         <a:t>&lt;</a:t>
                       </a:r>
                       <a:r>
-                        <a:rPr kumimoji="0" lang="en-US" sz="1050" b="1" kern="1200" baseline="0" dirty="0" err="1" smtClean="0">
+                        <a:rPr kumimoji="0" lang="en-US" sz="1200" b="1" kern="1200" baseline="0" dirty="0" err="1" smtClean="0">
                           <a:solidFill>
                             <a:schemeClr val="dk1"/>
                           </a:solidFill>
@@ -8580,7 +8387,7 @@
                         <a:t>figcaption</a:t>
                       </a:r>
                       <a:r>
-                        <a:rPr kumimoji="0" lang="en-US" sz="1050" b="1" kern="1200" baseline="0" dirty="0" smtClean="0">
+                        <a:rPr kumimoji="0" lang="en-US" sz="1200" b="1" kern="1200" baseline="0" dirty="0" smtClean="0">
                           <a:solidFill>
                             <a:schemeClr val="dk1"/>
                           </a:solidFill>
@@ -8617,20 +8424,20 @@
                         <a:defRPr/>
                       </a:pPr>
                       <a:r>
-                        <a:rPr lang="en-US" sz="1050" b="1" dirty="0" smtClean="0">
+                        <a:rPr lang="en-US" sz="1200" b="1" dirty="0" smtClean="0">
                           <a:latin typeface="Consolas" pitchFamily="49" charset="0"/>
                           <a:cs typeface="Consolas" pitchFamily="49" charset="0"/>
                         </a:rPr>
                         <a:t>Caption</a:t>
                       </a:r>
                       <a:r>
-                        <a:rPr lang="en-US" sz="1050" b="1" baseline="0" dirty="0" smtClean="0">
+                        <a:rPr lang="en-US" sz="1200" b="1" baseline="0" dirty="0" smtClean="0">
                           <a:latin typeface="Consolas" pitchFamily="49" charset="0"/>
                           <a:cs typeface="Consolas" pitchFamily="49" charset="0"/>
                         </a:rPr>
                         <a:t> to a figure</a:t>
                       </a:r>
-                      <a:endParaRPr lang="en-US" sz="1050" b="1" dirty="0" smtClean="0">
+                      <a:endParaRPr lang="en-US" sz="1200" b="1" dirty="0" smtClean="0">
                         <a:latin typeface="Consolas" pitchFamily="49" charset="0"/>
                         <a:cs typeface="Consolas" pitchFamily="49" charset="0"/>
                       </a:endParaRPr>
@@ -8646,7 +8453,7 @@
                     <a:lstStyle/>
                     <a:p>
                       <a:r>
-                        <a:rPr kumimoji="0" lang="en-US" sz="1050" b="1" kern="1200" baseline="0" dirty="0" smtClean="0">
+                        <a:rPr kumimoji="0" lang="en-US" sz="1200" b="1" kern="1200" baseline="0" dirty="0" smtClean="0">
                           <a:solidFill>
                             <a:schemeClr val="dk1"/>
                           </a:solidFill>
@@ -8683,20 +8490,20 @@
                         <a:defRPr/>
                       </a:pPr>
                       <a:r>
-                        <a:rPr lang="en-US" sz="1050" b="1" dirty="0" smtClean="0">
+                        <a:rPr lang="en-US" sz="1200" b="1" dirty="0" smtClean="0">
                           <a:latin typeface="Consolas" pitchFamily="49" charset="0"/>
                           <a:cs typeface="Consolas" pitchFamily="49" charset="0"/>
                         </a:rPr>
                         <a:t>Footer</a:t>
                       </a:r>
                       <a:r>
-                        <a:rPr lang="en-US" sz="1050" b="1" baseline="0" dirty="0" smtClean="0">
+                        <a:rPr lang="en-US" sz="1200" b="1" baseline="0" dirty="0" smtClean="0">
                           <a:latin typeface="Consolas" pitchFamily="49" charset="0"/>
                           <a:cs typeface="Consolas" pitchFamily="49" charset="0"/>
                         </a:rPr>
                         <a:t> for a section or page</a:t>
                       </a:r>
-                      <a:endParaRPr lang="en-US" sz="1050" b="1" dirty="0" smtClean="0">
+                      <a:endParaRPr lang="en-US" sz="1200" b="1" dirty="0" smtClean="0">
                         <a:latin typeface="Consolas" pitchFamily="49" charset="0"/>
                         <a:cs typeface="Consolas" pitchFamily="49" charset="0"/>
                       </a:endParaRPr>
@@ -8715,11 +8522,17 @@
           <p:cNvGraphicFramePr>
             <a:graphicFrameLocks noGrp="1"/>
           </p:cNvGraphicFramePr>
-          <p:nvPr/>
+          <p:nvPr>
+            <p:extLst>
+              <p:ext uri="{D42A27DB-BD31-4B8C-83A1-F6EECF244321}">
+                <p14:modId xmlns:p14="http://schemas.microsoft.com/office/powerpoint/2010/main" val="1190253476"/>
+              </p:ext>
+            </p:extLst>
+          </p:nvPr>
         </p:nvGraphicFramePr>
         <p:xfrm>
-          <a:off x="5638800" y="4038601"/>
-          <a:ext cx="3429000" cy="1440180"/>
+          <a:off x="228600" y="4375681"/>
+          <a:ext cx="4038600" cy="1615440"/>
         </p:xfrm>
         <a:graphic>
           <a:graphicData uri="http://schemas.openxmlformats.org/drawingml/2006/table">
@@ -8728,8 +8541,8 @@
                 <a:tableStyleId>{5C22544A-7EE6-4342-B048-85BDC9FD1C3A}</a:tableStyleId>
               </a:tblPr>
               <a:tblGrid>
-                <a:gridCol w="1143000"/>
-                <a:gridCol w="2286000"/>
+                <a:gridCol w="1166327"/>
+                <a:gridCol w="2872273"/>
               </a:tblGrid>
               <a:tr h="169088">
                 <a:tc gridSpan="2">
@@ -8738,10 +8551,10 @@
                     <a:lstStyle/>
                     <a:p>
                       <a:r>
-                        <a:rPr lang="en-US" sz="1200" dirty="0" smtClean="0"/>
+                        <a:rPr lang="en-US" sz="1600" dirty="0" smtClean="0"/>
                         <a:t>Media</a:t>
                       </a:r>
-                      <a:endParaRPr lang="en-US" sz="1200" dirty="0"/>
+                      <a:endParaRPr lang="en-US" sz="1600" dirty="0"/>
                     </a:p>
                   </a:txBody>
                   <a:tcPr>
@@ -8768,7 +8581,7 @@
                     <a:lstStyle/>
                     <a:p>
                       <a:r>
-                        <a:rPr kumimoji="0" lang="en-US" sz="1050" b="1" kern="1200" dirty="0" smtClean="0">
+                        <a:rPr kumimoji="0" lang="en-US" sz="1200" b="1" kern="1200" dirty="0" smtClean="0">
                           <a:solidFill>
                             <a:schemeClr val="dk1"/>
                           </a:solidFill>
@@ -8778,14 +8591,6 @@
                         </a:rPr>
                         <a:t>&lt;audio&gt;</a:t>
                       </a:r>
-                      <a:endParaRPr kumimoji="0" lang="en-US" sz="1050" b="1" kern="1200" dirty="0" smtClean="0">
-                        <a:solidFill>
-                          <a:schemeClr val="dk1"/>
-                        </a:solidFill>
-                        <a:latin typeface="Consolas" pitchFamily="49" charset="0"/>
-                        <a:ea typeface="+mn-ea"/>
-                        <a:cs typeface="Consolas" pitchFamily="49" charset="0"/>
-                      </a:endParaRPr>
                     </a:p>
                   </a:txBody>
                   <a:tcPr/>
@@ -8813,7 +8618,7 @@
                         <a:defRPr/>
                       </a:pPr>
                       <a:r>
-                        <a:rPr kumimoji="0" lang="en-US" sz="1050" b="1" kern="1200" dirty="0" smtClean="0">
+                        <a:rPr kumimoji="0" lang="en-US" sz="1200" b="1" kern="1200" dirty="0" smtClean="0">
                           <a:solidFill>
                             <a:schemeClr val="dk1"/>
                           </a:solidFill>
@@ -8823,14 +8628,6 @@
                         </a:rPr>
                         <a:t>Sound Files</a:t>
                       </a:r>
-                      <a:endParaRPr kumimoji="0" lang="en-US" sz="1050" b="1" kern="1200" dirty="0" smtClean="0">
-                        <a:solidFill>
-                          <a:schemeClr val="dk1"/>
-                        </a:solidFill>
-                        <a:latin typeface="Consolas" pitchFamily="49" charset="0"/>
-                        <a:ea typeface="+mn-ea"/>
-                        <a:cs typeface="Consolas" pitchFamily="49" charset="0"/>
-                      </a:endParaRPr>
                     </a:p>
                   </a:txBody>
                   <a:tcPr/>
@@ -8843,7 +8640,7 @@
                     <a:lstStyle/>
                     <a:p>
                       <a:r>
-                        <a:rPr kumimoji="0" lang="en-US" sz="1050" b="1" kern="1200" dirty="0" smtClean="0">
+                        <a:rPr kumimoji="0" lang="en-US" sz="1200" b="1" kern="1200" dirty="0" smtClean="0">
                           <a:solidFill>
                             <a:schemeClr val="dk1"/>
                           </a:solidFill>
@@ -8853,14 +8650,6 @@
                         </a:rPr>
                         <a:t>&lt;video&gt;</a:t>
                       </a:r>
-                      <a:endParaRPr kumimoji="0" lang="en-US" sz="1050" b="1" kern="1200" dirty="0" smtClean="0">
-                        <a:solidFill>
-                          <a:schemeClr val="dk1"/>
-                        </a:solidFill>
-                        <a:latin typeface="Consolas" pitchFamily="49" charset="0"/>
-                        <a:ea typeface="+mn-ea"/>
-                        <a:cs typeface="Consolas" pitchFamily="49" charset="0"/>
-                      </a:endParaRPr>
                     </a:p>
                   </a:txBody>
                   <a:tcPr/>
@@ -8888,7 +8677,7 @@
                         <a:defRPr/>
                       </a:pPr>
                       <a:r>
-                        <a:rPr kumimoji="0" lang="en-US" sz="1050" b="1" kern="1200" dirty="0" smtClean="0">
+                        <a:rPr kumimoji="0" lang="en-US" sz="1200" b="1" kern="1200" dirty="0" smtClean="0">
                           <a:solidFill>
                             <a:schemeClr val="dk1"/>
                           </a:solidFill>
@@ -8898,14 +8687,6 @@
                         </a:rPr>
                         <a:t>Video Files</a:t>
                       </a:r>
-                      <a:endParaRPr kumimoji="0" lang="en-US" sz="1050" b="1" kern="1200" dirty="0" smtClean="0">
-                        <a:solidFill>
-                          <a:schemeClr val="dk1"/>
-                        </a:solidFill>
-                        <a:latin typeface="Consolas" pitchFamily="49" charset="0"/>
-                        <a:ea typeface="+mn-ea"/>
-                        <a:cs typeface="Consolas" pitchFamily="49" charset="0"/>
-                      </a:endParaRPr>
                     </a:p>
                   </a:txBody>
                   <a:tcPr/>
@@ -8918,7 +8699,7 @@
                     <a:lstStyle/>
                     <a:p>
                       <a:r>
-                        <a:rPr kumimoji="0" lang="en-US" sz="1050" b="1" kern="1200" dirty="0" smtClean="0">
+                        <a:rPr kumimoji="0" lang="en-US" sz="1200" b="1" kern="1200" dirty="0" smtClean="0">
                           <a:solidFill>
                             <a:schemeClr val="dk1"/>
                           </a:solidFill>
@@ -8928,14 +8709,6 @@
                         </a:rPr>
                         <a:t>&lt;canvas&gt;</a:t>
                       </a:r>
-                      <a:endParaRPr kumimoji="0" lang="en-US" sz="1050" b="1" kern="1200" dirty="0" smtClean="0">
-                        <a:solidFill>
-                          <a:schemeClr val="dk1"/>
-                        </a:solidFill>
-                        <a:latin typeface="Consolas" pitchFamily="49" charset="0"/>
-                        <a:ea typeface="+mn-ea"/>
-                        <a:cs typeface="Consolas" pitchFamily="49" charset="0"/>
-                      </a:endParaRPr>
                     </a:p>
                   </a:txBody>
                   <a:tcPr/>
@@ -8963,7 +8736,7 @@
                         <a:defRPr/>
                       </a:pPr>
                       <a:r>
-                        <a:rPr kumimoji="0" lang="en-US" sz="1050" b="1" kern="1200" dirty="0" smtClean="0">
+                        <a:rPr kumimoji="0" lang="en-US" sz="1200" b="1" kern="1200" dirty="0" smtClean="0">
                           <a:solidFill>
                             <a:schemeClr val="dk1"/>
                           </a:solidFill>
@@ -8974,7 +8747,7 @@
                         <a:t>Area that can</a:t>
                       </a:r>
                       <a:r>
-                        <a:rPr kumimoji="0" lang="en-US" sz="1050" b="1" kern="1200" baseline="0" dirty="0" smtClean="0">
+                        <a:rPr kumimoji="0" lang="en-US" sz="1200" b="1" kern="1200" baseline="0" dirty="0" smtClean="0">
                           <a:solidFill>
                             <a:schemeClr val="dk1"/>
                           </a:solidFill>
@@ -8984,7 +8757,7 @@
                         </a:rPr>
                         <a:t> be used to draw graphics w/JavaScript</a:t>
                       </a:r>
-                      <a:endParaRPr kumimoji="0" lang="en-US" sz="1050" b="1" kern="1200" dirty="0" smtClean="0">
+                      <a:endParaRPr kumimoji="0" lang="en-US" sz="1200" b="1" kern="1200" dirty="0" smtClean="0">
                         <a:solidFill>
                           <a:schemeClr val="dk1"/>
                         </a:solidFill>
@@ -9004,13 +8777,13 @@
                     <a:lstStyle/>
                     <a:p>
                       <a:r>
-                        <a:rPr lang="en-US" sz="1050" b="1" dirty="0" smtClean="0">
+                        <a:rPr lang="en-US" sz="1200" b="1" dirty="0" smtClean="0">
                           <a:latin typeface="Consolas" pitchFamily="49" charset="0"/>
                           <a:cs typeface="Consolas" pitchFamily="49" charset="0"/>
                         </a:rPr>
                         <a:t>&lt;embed&gt;</a:t>
                       </a:r>
-                      <a:endParaRPr lang="en-US" sz="1050" dirty="0"/>
+                      <a:endParaRPr lang="en-US" sz="1200" dirty="0"/>
                     </a:p>
                   </a:txBody>
                   <a:tcPr/>
@@ -9038,13 +8811,772 @@
                         <a:defRPr/>
                       </a:pPr>
                       <a:r>
-                        <a:rPr lang="en-US" sz="1050" b="1" baseline="0" dirty="0" smtClean="0">
+                        <a:rPr lang="en-US" sz="1200" b="1" baseline="0" dirty="0" smtClean="0">
                           <a:latin typeface="Consolas" pitchFamily="49" charset="0"/>
                           <a:cs typeface="Consolas" pitchFamily="49" charset="0"/>
                         </a:rPr>
                         <a:t>Embedded Content</a:t>
                       </a:r>
-                      <a:endParaRPr lang="en-US" sz="1050" b="1" baseline="0" dirty="0" smtClean="0">
+                    </a:p>
+                  </a:txBody>
+                  <a:tcPr/>
+                </a:tc>
+              </a:tr>
+            </a:tbl>
+          </a:graphicData>
+        </a:graphic>
+      </p:graphicFrame>
+      <p:graphicFrame>
+        <p:nvGraphicFramePr>
+          <p:cNvPr id="5" name="Table 4"/>
+          <p:cNvGraphicFramePr>
+            <a:graphicFrameLocks noGrp="1"/>
+          </p:cNvGraphicFramePr>
+          <p:nvPr>
+            <p:extLst>
+              <p:ext uri="{D42A27DB-BD31-4B8C-83A1-F6EECF244321}">
+                <p14:modId xmlns:p14="http://schemas.microsoft.com/office/powerpoint/2010/main" val="2323010256"/>
+              </p:ext>
+            </p:extLst>
+          </p:nvPr>
+        </p:nvGraphicFramePr>
+        <p:xfrm>
+          <a:off x="4419600" y="762000"/>
+          <a:ext cx="3581400" cy="3926706"/>
+        </p:xfrm>
+        <a:graphic>
+          <a:graphicData uri="http://schemas.openxmlformats.org/drawingml/2006/table">
+            <a:tbl>
+              <a:tblPr firstRow="1" bandRow="1">
+                <a:tableStyleId>{5C22544A-7EE6-4342-B048-85BDC9FD1C3A}</a:tableStyleId>
+              </a:tblPr>
+              <a:tblGrid>
+                <a:gridCol w="1504188"/>
+                <a:gridCol w="2077212"/>
+              </a:tblGrid>
+              <a:tr h="247316">
+                <a:tc gridSpan="2">
+                  <a:txBody>
+                    <a:bodyPr/>
+                    <a:lstStyle/>
+                    <a:p>
+                      <a:r>
+                        <a:rPr lang="en-US" sz="1600" dirty="0" smtClean="0"/>
+                        <a:t>HTML Entities (Special</a:t>
+                      </a:r>
+                      <a:r>
+                        <a:rPr lang="en-US" sz="1600" baseline="0" dirty="0" smtClean="0"/>
+                        <a:t> Symbols)</a:t>
+                      </a:r>
+                      <a:endParaRPr lang="en-US" sz="1600" dirty="0"/>
+                    </a:p>
+                  </a:txBody>
+                  <a:tcPr>
+                    <a:solidFill>
+                      <a:schemeClr val="accent3"/>
+                    </a:solidFill>
+                  </a:tcPr>
+                </a:tc>
+                <a:tc hMerge="1">
+                  <a:txBody>
+                    <a:bodyPr/>
+                    <a:lstStyle/>
+                    <a:p>
+                      <a:endParaRPr lang="en-US" dirty="0"/>
+                    </a:p>
+                  </a:txBody>
+                  <a:tcPr/>
+                </a:tc>
+              </a:tr>
+              <a:tr h="346242">
+                <a:tc>
+                  <a:txBody>
+                    <a:bodyPr/>
+                    <a:lstStyle/>
+                    <a:p>
+                      <a:r>
+                        <a:rPr kumimoji="0" lang="en-US" sz="1200" b="1" kern="1200" dirty="0" smtClean="0">
+                          <a:solidFill>
+                            <a:schemeClr val="dk1"/>
+                          </a:solidFill>
+                          <a:latin typeface="Consolas" pitchFamily="49" charset="0"/>
+                          <a:ea typeface="+mn-ea"/>
+                          <a:cs typeface="Consolas" pitchFamily="49" charset="0"/>
+                        </a:rPr>
+                        <a:t>&amp; (ampersand)</a:t>
+                      </a:r>
+                    </a:p>
+                  </a:txBody>
+                  <a:tcPr/>
+                </a:tc>
+                <a:tc>
+                  <a:txBody>
+                    <a:bodyPr/>
+                    <a:lstStyle/>
+                    <a:p>
+                      <a:pPr marL="0" marR="0" indent="0" algn="l" defTabSz="914400" rtl="0" eaLnBrk="1" fontAlgn="auto" latinLnBrk="0" hangingPunct="1">
+                        <a:lnSpc>
+                          <a:spcPct val="100000"/>
+                        </a:lnSpc>
+                        <a:spcBef>
+                          <a:spcPts val="0"/>
+                        </a:spcBef>
+                        <a:spcAft>
+                          <a:spcPts val="0"/>
+                        </a:spcAft>
+                        <a:buClrTx/>
+                        <a:buSzTx/>
+                        <a:buFontTx/>
+                        <a:buNone/>
+                        <a:tabLst/>
+                        <a:defRPr/>
+                      </a:pPr>
+                      <a:r>
+                        <a:rPr kumimoji="0" lang="en-US" sz="1200" b="1" i="1" kern="1200" dirty="0" smtClean="0">
+                          <a:solidFill>
+                            <a:schemeClr val="dk1"/>
+                          </a:solidFill>
+                          <a:latin typeface="Consolas" pitchFamily="49" charset="0"/>
+                          <a:ea typeface="+mn-ea"/>
+                          <a:cs typeface="Consolas" pitchFamily="49" charset="0"/>
+                        </a:rPr>
+                        <a:t>&amp;amp;</a:t>
+                      </a:r>
+                    </a:p>
+                  </a:txBody>
+                  <a:tcPr/>
+                </a:tc>
+              </a:tr>
+              <a:tr h="346242">
+                <a:tc>
+                  <a:txBody>
+                    <a:bodyPr/>
+                    <a:lstStyle/>
+                    <a:p>
+                      <a:r>
+                        <a:rPr kumimoji="0" lang="en-US" sz="1200" b="1" kern="1200" dirty="0" smtClean="0">
+                          <a:solidFill>
+                            <a:schemeClr val="dk1"/>
+                          </a:solidFill>
+                          <a:latin typeface="Consolas" pitchFamily="49" charset="0"/>
+                          <a:ea typeface="+mn-ea"/>
+                          <a:cs typeface="Consolas" pitchFamily="49" charset="0"/>
+                        </a:rPr>
+                        <a:t>© (</a:t>
+                      </a:r>
+                      <a:r>
+                        <a:rPr kumimoji="0" lang="en-US" sz="1200" b="1" kern="1200" dirty="0" err="1" smtClean="0">
+                          <a:solidFill>
+                            <a:schemeClr val="dk1"/>
+                          </a:solidFill>
+                          <a:latin typeface="Consolas" pitchFamily="49" charset="0"/>
+                          <a:ea typeface="+mn-ea"/>
+                          <a:cs typeface="Consolas" pitchFamily="49" charset="0"/>
+                        </a:rPr>
+                        <a:t>copywrite</a:t>
+                      </a:r>
+                      <a:r>
+                        <a:rPr kumimoji="0" lang="en-US" sz="1200" b="1" kern="1200" dirty="0" smtClean="0">
+                          <a:solidFill>
+                            <a:schemeClr val="dk1"/>
+                          </a:solidFill>
+                          <a:latin typeface="Consolas" pitchFamily="49" charset="0"/>
+                          <a:ea typeface="+mn-ea"/>
+                          <a:cs typeface="Consolas" pitchFamily="49" charset="0"/>
+                        </a:rPr>
+                        <a:t>)</a:t>
+                      </a:r>
+                    </a:p>
+                  </a:txBody>
+                  <a:tcPr/>
+                </a:tc>
+                <a:tc>
+                  <a:txBody>
+                    <a:bodyPr/>
+                    <a:lstStyle/>
+                    <a:p>
+                      <a:pPr marL="0" marR="0" indent="0" algn="l" defTabSz="914400" rtl="0" eaLnBrk="1" fontAlgn="auto" latinLnBrk="0" hangingPunct="1">
+                        <a:lnSpc>
+                          <a:spcPct val="100000"/>
+                        </a:lnSpc>
+                        <a:spcBef>
+                          <a:spcPts val="0"/>
+                        </a:spcBef>
+                        <a:spcAft>
+                          <a:spcPts val="0"/>
+                        </a:spcAft>
+                        <a:buClrTx/>
+                        <a:buSzTx/>
+                        <a:buFontTx/>
+                        <a:buNone/>
+                        <a:tabLst/>
+                        <a:defRPr/>
+                      </a:pPr>
+                      <a:r>
+                        <a:rPr kumimoji="0" lang="en-US" sz="1200" b="1" i="1" kern="1200" dirty="0" smtClean="0">
+                          <a:solidFill>
+                            <a:schemeClr val="dk1"/>
+                          </a:solidFill>
+                          <a:latin typeface="Consolas" pitchFamily="49" charset="0"/>
+                          <a:ea typeface="+mn-ea"/>
+                          <a:cs typeface="Consolas" pitchFamily="49" charset="0"/>
+                        </a:rPr>
+                        <a:t>&amp;copy;</a:t>
+                      </a:r>
+                    </a:p>
+                  </a:txBody>
+                  <a:tcPr/>
+                </a:tc>
+              </a:tr>
+              <a:tr h="210218">
+                <a:tc>
+                  <a:txBody>
+                    <a:bodyPr/>
+                    <a:lstStyle/>
+                    <a:p>
+                      <a:r>
+                        <a:rPr lang="en-US" sz="1200" b="1" dirty="0" smtClean="0"/>
+                        <a:t>™</a:t>
+                      </a:r>
+                      <a:r>
+                        <a:rPr kumimoji="0" lang="en-US" sz="1200" b="1" kern="1200" dirty="0" smtClean="0">
+                          <a:solidFill>
+                            <a:schemeClr val="dk1"/>
+                          </a:solidFill>
+                          <a:latin typeface="Consolas" pitchFamily="49" charset="0"/>
+                          <a:ea typeface="+mn-ea"/>
+                          <a:cs typeface="Consolas" pitchFamily="49" charset="0"/>
+                        </a:rPr>
+                        <a:t> (trademark)</a:t>
+                      </a:r>
+                    </a:p>
+                  </a:txBody>
+                  <a:tcPr/>
+                </a:tc>
+                <a:tc>
+                  <a:txBody>
+                    <a:bodyPr/>
+                    <a:lstStyle/>
+                    <a:p>
+                      <a:pPr marL="0" marR="0" indent="0" algn="l" defTabSz="914400" rtl="0" eaLnBrk="1" fontAlgn="auto" latinLnBrk="0" hangingPunct="1">
+                        <a:lnSpc>
+                          <a:spcPct val="100000"/>
+                        </a:lnSpc>
+                        <a:spcBef>
+                          <a:spcPts val="0"/>
+                        </a:spcBef>
+                        <a:spcAft>
+                          <a:spcPts val="0"/>
+                        </a:spcAft>
+                        <a:buClrTx/>
+                        <a:buSzTx/>
+                        <a:buFontTx/>
+                        <a:buNone/>
+                        <a:tabLst/>
+                        <a:defRPr/>
+                      </a:pPr>
+                      <a:r>
+                        <a:rPr kumimoji="0" lang="en-US" sz="1200" b="1" i="1" kern="1200" dirty="0" smtClean="0">
+                          <a:solidFill>
+                            <a:schemeClr val="dk1"/>
+                          </a:solidFill>
+                          <a:latin typeface="Consolas" pitchFamily="49" charset="0"/>
+                          <a:ea typeface="+mn-ea"/>
+                          <a:cs typeface="Consolas" pitchFamily="49" charset="0"/>
+                        </a:rPr>
+                        <a:t>&amp;trade;</a:t>
+                      </a:r>
+                    </a:p>
+                  </a:txBody>
+                  <a:tcPr/>
+                </a:tc>
+              </a:tr>
+              <a:tr h="210218">
+                <a:tc>
+                  <a:txBody>
+                    <a:bodyPr/>
+                    <a:lstStyle/>
+                    <a:p>
+                      <a:r>
+                        <a:rPr kumimoji="0" lang="en-US" sz="1200" b="1" kern="1200" dirty="0" smtClean="0">
+                          <a:solidFill>
+                            <a:schemeClr val="dk1"/>
+                          </a:solidFill>
+                          <a:latin typeface="Consolas" pitchFamily="49" charset="0"/>
+                          <a:ea typeface="+mn-ea"/>
+                          <a:cs typeface="Consolas" pitchFamily="49" charset="0"/>
+                        </a:rPr>
+                        <a:t>† (dagger)</a:t>
+                      </a:r>
+                      <a:endParaRPr kumimoji="0" lang="en-US" sz="1200" b="1" kern="1200" dirty="0">
+                        <a:solidFill>
+                          <a:schemeClr val="dk1"/>
+                        </a:solidFill>
+                        <a:latin typeface="Consolas" pitchFamily="49" charset="0"/>
+                        <a:ea typeface="+mn-ea"/>
+                        <a:cs typeface="Consolas" pitchFamily="49" charset="0"/>
+                      </a:endParaRPr>
+                    </a:p>
+                  </a:txBody>
+                  <a:tcPr/>
+                </a:tc>
+                <a:tc>
+                  <a:txBody>
+                    <a:bodyPr/>
+                    <a:lstStyle/>
+                    <a:p>
+                      <a:pPr marL="0" marR="0" indent="0" algn="l" defTabSz="914400" rtl="0" eaLnBrk="1" fontAlgn="auto" latinLnBrk="0" hangingPunct="1">
+                        <a:lnSpc>
+                          <a:spcPct val="100000"/>
+                        </a:lnSpc>
+                        <a:spcBef>
+                          <a:spcPts val="0"/>
+                        </a:spcBef>
+                        <a:spcAft>
+                          <a:spcPts val="0"/>
+                        </a:spcAft>
+                        <a:buClrTx/>
+                        <a:buSzTx/>
+                        <a:buFontTx/>
+                        <a:buNone/>
+                        <a:tabLst/>
+                        <a:defRPr/>
+                      </a:pPr>
+                      <a:r>
+                        <a:rPr lang="en-US" sz="1200" b="1" i="1" baseline="0" dirty="0" smtClean="0">
+                          <a:latin typeface="Consolas" pitchFamily="49" charset="0"/>
+                          <a:cs typeface="Consolas" pitchFamily="49" charset="0"/>
+                        </a:rPr>
+                        <a:t>&amp;dagger;</a:t>
+                      </a:r>
+                    </a:p>
+                  </a:txBody>
+                  <a:tcPr/>
+                </a:tc>
+              </a:tr>
+              <a:tr h="346242">
+                <a:tc>
+                  <a:txBody>
+                    <a:bodyPr/>
+                    <a:lstStyle/>
+                    <a:p>
+                      <a:r>
+                        <a:rPr lang="en-US" sz="1200" b="1" dirty="0" smtClean="0"/>
+                        <a:t>♥</a:t>
+                      </a:r>
+                      <a:r>
+                        <a:rPr kumimoji="0" lang="en-US" sz="1200" b="1" kern="1200" baseline="0" dirty="0" smtClean="0">
+                          <a:solidFill>
+                            <a:schemeClr val="dk1"/>
+                          </a:solidFill>
+                          <a:latin typeface="Consolas" pitchFamily="49" charset="0"/>
+                          <a:ea typeface="+mn-ea"/>
+                          <a:cs typeface="Consolas" pitchFamily="49" charset="0"/>
+                        </a:rPr>
+                        <a:t> (hearts)</a:t>
+                      </a:r>
+                      <a:endParaRPr kumimoji="0" lang="en-US" sz="1200" b="1" kern="1200" dirty="0">
+                        <a:solidFill>
+                          <a:schemeClr val="dk1"/>
+                        </a:solidFill>
+                        <a:latin typeface="Consolas" pitchFamily="49" charset="0"/>
+                        <a:ea typeface="+mn-ea"/>
+                        <a:cs typeface="Consolas" pitchFamily="49" charset="0"/>
+                      </a:endParaRPr>
+                    </a:p>
+                  </a:txBody>
+                  <a:tcPr/>
+                </a:tc>
+                <a:tc>
+                  <a:txBody>
+                    <a:bodyPr/>
+                    <a:lstStyle/>
+                    <a:p>
+                      <a:pPr marL="0" marR="0" indent="0" algn="l" defTabSz="914400" rtl="0" eaLnBrk="1" fontAlgn="auto" latinLnBrk="0" hangingPunct="1">
+                        <a:lnSpc>
+                          <a:spcPct val="100000"/>
+                        </a:lnSpc>
+                        <a:spcBef>
+                          <a:spcPts val="0"/>
+                        </a:spcBef>
+                        <a:spcAft>
+                          <a:spcPts val="0"/>
+                        </a:spcAft>
+                        <a:buClrTx/>
+                        <a:buSzTx/>
+                        <a:buFontTx/>
+                        <a:buNone/>
+                        <a:tabLst/>
+                        <a:defRPr/>
+                      </a:pPr>
+                      <a:r>
+                        <a:rPr lang="en-US" sz="1200" b="1" i="1" baseline="0" dirty="0" smtClean="0">
+                          <a:latin typeface="Consolas" pitchFamily="49" charset="0"/>
+                          <a:cs typeface="Consolas" pitchFamily="49" charset="0"/>
+                        </a:rPr>
+                        <a:t>&amp;hearts;</a:t>
+                      </a:r>
+                    </a:p>
+                  </a:txBody>
+                  <a:tcPr/>
+                </a:tc>
+              </a:tr>
+              <a:tr h="210218">
+                <a:tc>
+                  <a:txBody>
+                    <a:bodyPr/>
+                    <a:lstStyle/>
+                    <a:p>
+                      <a:r>
+                        <a:rPr lang="en-US" sz="1200" b="1" dirty="0" smtClean="0"/>
+                        <a:t>♠ </a:t>
+                      </a:r>
+                      <a:r>
+                        <a:rPr kumimoji="0" lang="en-US" sz="1200" b="1" kern="1200" dirty="0" smtClean="0">
+                          <a:solidFill>
+                            <a:schemeClr val="dk1"/>
+                          </a:solidFill>
+                          <a:latin typeface="Consolas" pitchFamily="49" charset="0"/>
+                          <a:ea typeface="+mn-ea"/>
+                          <a:cs typeface="Consolas" pitchFamily="49" charset="0"/>
+                        </a:rPr>
+                        <a:t>(spades)</a:t>
+                      </a:r>
+                      <a:endParaRPr kumimoji="0" lang="en-US" sz="1200" b="1" kern="1200" dirty="0">
+                        <a:solidFill>
+                          <a:schemeClr val="dk1"/>
+                        </a:solidFill>
+                        <a:latin typeface="Consolas" pitchFamily="49" charset="0"/>
+                        <a:ea typeface="+mn-ea"/>
+                        <a:cs typeface="Consolas" pitchFamily="49" charset="0"/>
+                      </a:endParaRPr>
+                    </a:p>
+                  </a:txBody>
+                  <a:tcPr/>
+                </a:tc>
+                <a:tc>
+                  <a:txBody>
+                    <a:bodyPr/>
+                    <a:lstStyle/>
+                    <a:p>
+                      <a:pPr marL="0" marR="0" indent="0" algn="l" defTabSz="914400" rtl="0" eaLnBrk="1" fontAlgn="auto" latinLnBrk="0" hangingPunct="1">
+                        <a:lnSpc>
+                          <a:spcPct val="100000"/>
+                        </a:lnSpc>
+                        <a:spcBef>
+                          <a:spcPts val="0"/>
+                        </a:spcBef>
+                        <a:spcAft>
+                          <a:spcPts val="0"/>
+                        </a:spcAft>
+                        <a:buClrTx/>
+                        <a:buSzTx/>
+                        <a:buFontTx/>
+                        <a:buNone/>
+                        <a:tabLst/>
+                        <a:defRPr/>
+                      </a:pPr>
+                      <a:r>
+                        <a:rPr lang="en-US" sz="1200" b="1" i="1" baseline="0" dirty="0" smtClean="0">
+                          <a:latin typeface="Consolas" pitchFamily="49" charset="0"/>
+                          <a:cs typeface="Consolas" pitchFamily="49" charset="0"/>
+                        </a:rPr>
+                        <a:t>&amp;spades;</a:t>
+                      </a:r>
+                    </a:p>
+                  </a:txBody>
+                  <a:tcPr/>
+                </a:tc>
+              </a:tr>
+              <a:tr h="346242">
+                <a:tc>
+                  <a:txBody>
+                    <a:bodyPr/>
+                    <a:lstStyle/>
+                    <a:p>
+                      <a:r>
+                        <a:rPr lang="en-US" sz="1200" b="1" dirty="0" smtClean="0"/>
+                        <a:t>♣ </a:t>
+                      </a:r>
+                      <a:r>
+                        <a:rPr kumimoji="0" lang="en-US" sz="1200" b="1" kern="1200" dirty="0" smtClean="0">
+                          <a:solidFill>
+                            <a:schemeClr val="dk1"/>
+                          </a:solidFill>
+                          <a:latin typeface="Consolas" pitchFamily="49" charset="0"/>
+                          <a:ea typeface="+mn-ea"/>
+                          <a:cs typeface="Consolas" pitchFamily="49" charset="0"/>
+                        </a:rPr>
+                        <a:t>(clubs)</a:t>
+                      </a:r>
+                      <a:endParaRPr kumimoji="0" lang="en-US" sz="1200" b="1" kern="1200" dirty="0">
+                        <a:solidFill>
+                          <a:schemeClr val="dk1"/>
+                        </a:solidFill>
+                        <a:latin typeface="Consolas" pitchFamily="49" charset="0"/>
+                        <a:ea typeface="+mn-ea"/>
+                        <a:cs typeface="Consolas" pitchFamily="49" charset="0"/>
+                      </a:endParaRPr>
+                    </a:p>
+                  </a:txBody>
+                  <a:tcPr/>
+                </a:tc>
+                <a:tc>
+                  <a:txBody>
+                    <a:bodyPr/>
+                    <a:lstStyle/>
+                    <a:p>
+                      <a:pPr marL="0" marR="0" indent="0" algn="l" defTabSz="914400" rtl="0" eaLnBrk="1" fontAlgn="auto" latinLnBrk="0" hangingPunct="1">
+                        <a:lnSpc>
+                          <a:spcPct val="100000"/>
+                        </a:lnSpc>
+                        <a:spcBef>
+                          <a:spcPts val="0"/>
+                        </a:spcBef>
+                        <a:spcAft>
+                          <a:spcPts val="0"/>
+                        </a:spcAft>
+                        <a:buClrTx/>
+                        <a:buSzTx/>
+                        <a:buFontTx/>
+                        <a:buNone/>
+                        <a:tabLst/>
+                        <a:defRPr/>
+                      </a:pPr>
+                      <a:r>
+                        <a:rPr lang="en-US" sz="1200" b="1" i="1" baseline="0" dirty="0" smtClean="0">
+                          <a:latin typeface="Consolas" pitchFamily="49" charset="0"/>
+                          <a:cs typeface="Consolas" pitchFamily="49" charset="0"/>
+                        </a:rPr>
+                        <a:t>&amp;clubs;</a:t>
+                      </a:r>
+                      <a:endParaRPr lang="en-US" sz="1200" b="1" i="1" dirty="0" smtClean="0">
+                        <a:latin typeface="Consolas" pitchFamily="49" charset="0"/>
+                        <a:cs typeface="Consolas" pitchFamily="49" charset="0"/>
+                      </a:endParaRPr>
+                    </a:p>
+                  </a:txBody>
+                  <a:tcPr/>
+                </a:tc>
+              </a:tr>
+              <a:tr h="286218">
+                <a:tc>
+                  <a:txBody>
+                    <a:bodyPr/>
+                    <a:lstStyle/>
+                    <a:p>
+                      <a:r>
+                        <a:rPr lang="en-US" sz="1200" b="1" dirty="0" smtClean="0"/>
+                        <a:t>♦ </a:t>
+                      </a:r>
+                      <a:r>
+                        <a:rPr kumimoji="0" lang="en-US" sz="1200" b="1" kern="1200" dirty="0" smtClean="0">
+                          <a:solidFill>
+                            <a:schemeClr val="dk1"/>
+                          </a:solidFill>
+                          <a:latin typeface="Consolas" pitchFamily="49" charset="0"/>
+                          <a:ea typeface="+mn-ea"/>
+                          <a:cs typeface="Consolas" pitchFamily="49" charset="0"/>
+                        </a:rPr>
+                        <a:t>(diamonds)</a:t>
+                      </a:r>
+                    </a:p>
+                  </a:txBody>
+                  <a:tcPr/>
+                </a:tc>
+                <a:tc>
+                  <a:txBody>
+                    <a:bodyPr/>
+                    <a:lstStyle/>
+                    <a:p>
+                      <a:pPr marL="0" marR="0" indent="0" algn="l" defTabSz="914400" rtl="0" eaLnBrk="1" fontAlgn="auto" latinLnBrk="0" hangingPunct="1">
+                        <a:lnSpc>
+                          <a:spcPct val="100000"/>
+                        </a:lnSpc>
+                        <a:spcBef>
+                          <a:spcPts val="0"/>
+                        </a:spcBef>
+                        <a:spcAft>
+                          <a:spcPts val="0"/>
+                        </a:spcAft>
+                        <a:buClrTx/>
+                        <a:buSzTx/>
+                        <a:buFontTx/>
+                        <a:buNone/>
+                        <a:tabLst/>
+                        <a:defRPr/>
+                      </a:pPr>
+                      <a:r>
+                        <a:rPr lang="en-US" sz="1200" b="1" i="1" dirty="0" smtClean="0">
+                          <a:latin typeface="Consolas" pitchFamily="49" charset="0"/>
+                          <a:cs typeface="Consolas" pitchFamily="49" charset="0"/>
+                        </a:rPr>
+                        <a:t>&amp;</a:t>
+                      </a:r>
+                      <a:r>
+                        <a:rPr lang="en-US" sz="1200" b="1" i="1" dirty="0" err="1" smtClean="0">
+                          <a:latin typeface="Consolas" pitchFamily="49" charset="0"/>
+                          <a:cs typeface="Consolas" pitchFamily="49" charset="0"/>
+                        </a:rPr>
+                        <a:t>diams</a:t>
+                      </a:r>
+                      <a:r>
+                        <a:rPr lang="en-US" sz="1200" b="1" i="1" dirty="0" smtClean="0">
+                          <a:latin typeface="Consolas" pitchFamily="49" charset="0"/>
+                          <a:cs typeface="Consolas" pitchFamily="49" charset="0"/>
+                        </a:rPr>
+                        <a:t>;</a:t>
+                      </a:r>
+                    </a:p>
+                  </a:txBody>
+                  <a:tcPr/>
+                </a:tc>
+              </a:tr>
+              <a:tr h="346242">
+                <a:tc>
+                  <a:txBody>
+                    <a:bodyPr/>
+                    <a:lstStyle/>
+                    <a:p>
+                      <a:r>
+                        <a:rPr lang="en-US" sz="1200" b="1" dirty="0" smtClean="0"/>
+                        <a:t>½ ¼ ¾ </a:t>
+                      </a:r>
+                      <a:r>
+                        <a:rPr kumimoji="0" lang="en-US" sz="1200" b="1" kern="1200" dirty="0" smtClean="0">
+                          <a:solidFill>
+                            <a:schemeClr val="dk1"/>
+                          </a:solidFill>
+                          <a:latin typeface="Consolas" pitchFamily="49" charset="0"/>
+                          <a:ea typeface="+mn-ea"/>
+                          <a:cs typeface="Consolas" pitchFamily="49" charset="0"/>
+                        </a:rPr>
+                        <a:t>(fractions)</a:t>
+                      </a:r>
+                    </a:p>
+                  </a:txBody>
+                  <a:tcPr/>
+                </a:tc>
+                <a:tc>
+                  <a:txBody>
+                    <a:bodyPr/>
+                    <a:lstStyle/>
+                    <a:p>
+                      <a:pPr marL="0" marR="0" indent="0" algn="l" defTabSz="914400" rtl="0" eaLnBrk="1" fontAlgn="auto" latinLnBrk="0" hangingPunct="1">
+                        <a:lnSpc>
+                          <a:spcPct val="100000"/>
+                        </a:lnSpc>
+                        <a:spcBef>
+                          <a:spcPts val="0"/>
+                        </a:spcBef>
+                        <a:spcAft>
+                          <a:spcPts val="0"/>
+                        </a:spcAft>
+                        <a:buClrTx/>
+                        <a:buSzTx/>
+                        <a:buFontTx/>
+                        <a:buNone/>
+                        <a:tabLst/>
+                        <a:defRPr/>
+                      </a:pPr>
+                      <a:r>
+                        <a:rPr lang="en-US" sz="1200" b="1" i="1" dirty="0" smtClean="0">
+                          <a:latin typeface="Consolas" pitchFamily="49" charset="0"/>
+                          <a:cs typeface="Consolas" pitchFamily="49" charset="0"/>
+                        </a:rPr>
+                        <a:t>&amp;frac12; &amp;frac14; &amp;frac34;</a:t>
+                      </a:r>
+                    </a:p>
+                  </a:txBody>
+                  <a:tcPr/>
+                </a:tc>
+              </a:tr>
+              <a:tr h="346242">
+                <a:tc gridSpan="2">
+                  <a:txBody>
+                    <a:bodyPr/>
+                    <a:lstStyle/>
+                    <a:p>
+                      <a:r>
+                        <a:rPr kumimoji="0" lang="en-US" sz="1200" b="1" kern="1200" dirty="0" smtClean="0">
+                          <a:solidFill>
+                            <a:schemeClr val="dk1"/>
+                          </a:solidFill>
+                          <a:latin typeface="Consolas" pitchFamily="49" charset="0"/>
+                          <a:ea typeface="+mn-ea"/>
+                          <a:cs typeface="Consolas" pitchFamily="49" charset="0"/>
+                        </a:rPr>
+                        <a:t>Source:</a:t>
+                      </a:r>
+                      <a:r>
+                        <a:rPr kumimoji="0" lang="en-US" sz="1200" b="1" kern="1200" baseline="0" dirty="0" smtClean="0">
+                          <a:solidFill>
+                            <a:schemeClr val="dk1"/>
+                          </a:solidFill>
+                          <a:latin typeface="Consolas" pitchFamily="49" charset="0"/>
+                          <a:ea typeface="+mn-ea"/>
+                          <a:cs typeface="Consolas" pitchFamily="49" charset="0"/>
+                        </a:rPr>
+                        <a:t> </a:t>
+                      </a:r>
+                      <a:r>
+                        <a:rPr kumimoji="0" lang="en-US" sz="1200" b="1" kern="1200" baseline="0" dirty="0" smtClean="0">
+                          <a:solidFill>
+                            <a:schemeClr val="dk1"/>
+                          </a:solidFill>
+                          <a:latin typeface="Consolas" pitchFamily="49" charset="0"/>
+                          <a:ea typeface="+mn-ea"/>
+                          <a:cs typeface="Consolas" pitchFamily="49" charset="0"/>
+                          <a:hlinkClick r:id="rId2"/>
+                        </a:rPr>
+                        <a:t>http://en.wikipedia.org/wiki/List_of_XML_and_HTML_character_entity_references</a:t>
+                      </a:r>
+                      <a:r>
+                        <a:rPr kumimoji="0" lang="en-US" sz="1200" b="1" kern="1200" baseline="0" dirty="0" smtClean="0">
+                          <a:solidFill>
+                            <a:schemeClr val="dk1"/>
+                          </a:solidFill>
+                          <a:latin typeface="Consolas" pitchFamily="49" charset="0"/>
+                          <a:ea typeface="+mn-ea"/>
+                          <a:cs typeface="Consolas" pitchFamily="49" charset="0"/>
+                        </a:rPr>
+                        <a:t> </a:t>
+                      </a:r>
+                      <a:endParaRPr kumimoji="0" lang="en-US" sz="1200" b="1" kern="1200" dirty="0" smtClean="0">
+                        <a:solidFill>
+                          <a:schemeClr val="dk1"/>
+                        </a:solidFill>
+                        <a:latin typeface="Consolas" pitchFamily="49" charset="0"/>
+                        <a:ea typeface="+mn-ea"/>
+                        <a:cs typeface="Consolas" pitchFamily="49" charset="0"/>
+                      </a:endParaRPr>
+                    </a:p>
+                  </a:txBody>
+                  <a:tcPr/>
+                </a:tc>
+                <a:tc hMerge="1">
+                  <a:txBody>
+                    <a:bodyPr/>
+                    <a:lstStyle/>
+                    <a:p>
+                      <a:pPr marL="0" marR="0" indent="0" algn="l" defTabSz="914400" rtl="0" eaLnBrk="1" fontAlgn="auto" latinLnBrk="0" hangingPunct="1">
+                        <a:lnSpc>
+                          <a:spcPct val="100000"/>
+                        </a:lnSpc>
+                        <a:spcBef>
+                          <a:spcPts val="0"/>
+                        </a:spcBef>
+                        <a:spcAft>
+                          <a:spcPts val="0"/>
+                        </a:spcAft>
+                        <a:buClrTx/>
+                        <a:buSzTx/>
+                        <a:buFontTx/>
+                        <a:buNone/>
+                        <a:tabLst/>
+                        <a:defRPr/>
+                      </a:pPr>
+                      <a:endParaRPr lang="en-US" sz="1200" b="1" i="1" dirty="0" smtClean="0">
                         <a:latin typeface="Consolas" pitchFamily="49" charset="0"/>
                         <a:cs typeface="Consolas" pitchFamily="49" charset="0"/>
                       </a:endParaRPr>

</xml_diff>